<commit_message>
EV3Lessons Web v4.9.5 Beta
</commit_message>
<xml_diff>
--- a/_site/resources/AboutFLL.pptx
+++ b/_site/resources/AboutFLL.pptx
@@ -1,9 +1,12 @@
 
 <file path=ppt/presentation.xml><?xml version="1.0" encoding="utf-8"?>
-<p:presentation xmlns:a="http://schemas.openxmlformats.org/drawingml/2006/main" xmlns:r="http://schemas.openxmlformats.org/officeDocument/2006/relationships" xmlns:p="http://schemas.openxmlformats.org/presentationml/2006/main" saveSubsetFonts="1">
+<p:presentation xmlns:a="http://schemas.openxmlformats.org/drawingml/2006/main" xmlns:r="http://schemas.openxmlformats.org/officeDocument/2006/relationships" xmlns:p="http://schemas.openxmlformats.org/presentationml/2006/main" showSpecialPlsOnTitleSld="0" saveSubsetFonts="1">
   <p:sldMasterIdLst>
     <p:sldMasterId id="2147483660" r:id="rId1"/>
   </p:sldMasterIdLst>
+  <p:notesMasterIdLst>
+    <p:notesMasterId r:id="rId11"/>
+  </p:notesMasterIdLst>
   <p:sldIdLst>
     <p:sldId id="256" r:id="rId2"/>
     <p:sldId id="260" r:id="rId3"/>
@@ -12,6 +15,8 @@
     <p:sldId id="261" r:id="rId6"/>
     <p:sldId id="259" r:id="rId7"/>
     <p:sldId id="262" r:id="rId8"/>
+    <p:sldId id="264" r:id="rId9"/>
+    <p:sldId id="263" r:id="rId10"/>
   </p:sldIdLst>
   <p:sldSz cx="9144000" cy="6858000" type="screen4x3"/>
   <p:notesSz cx="6858000" cy="9144000"/>
@@ -118,6 +123,440 @@
 </p:presentation>
 </file>
 
+<file path=ppt/notesMasters/notesMaster1.xml><?xml version="1.0" encoding="utf-8"?>
+<p:notesMaster xmlns:a="http://schemas.openxmlformats.org/drawingml/2006/main" xmlns:r="http://schemas.openxmlformats.org/officeDocument/2006/relationships" xmlns:p="http://schemas.openxmlformats.org/presentationml/2006/main">
+  <p:cSld>
+    <p:bg>
+      <p:bgRef idx="1001">
+        <a:schemeClr val="bg1"/>
+      </p:bgRef>
+    </p:bg>
+    <p:spTree>
+      <p:nvGrpSpPr>
+        <p:cNvPr id="1" name=""/>
+        <p:cNvGrpSpPr/>
+        <p:nvPr/>
+      </p:nvGrpSpPr>
+      <p:grpSpPr>
+        <a:xfrm>
+          <a:off x="0" y="0"/>
+          <a:ext cx="0" cy="0"/>
+          <a:chOff x="0" y="0"/>
+          <a:chExt cx="0" cy="0"/>
+        </a:xfrm>
+      </p:grpSpPr>
+      <p:sp>
+        <p:nvSpPr>
+          <p:cNvPr id="2" name="Header Placeholder 1"/>
+          <p:cNvSpPr>
+            <a:spLocks noGrp="1"/>
+          </p:cNvSpPr>
+          <p:nvPr>
+            <p:ph type="hdr" sz="quarter"/>
+          </p:nvPr>
+        </p:nvSpPr>
+        <p:spPr>
+          <a:xfrm>
+            <a:off x="0" y="0"/>
+            <a:ext cx="2971800" cy="458788"/>
+          </a:xfrm>
+          <a:prstGeom prst="rect">
+            <a:avLst/>
+          </a:prstGeom>
+        </p:spPr>
+        <p:txBody>
+          <a:bodyPr vert="horz" lIns="91440" tIns="45720" rIns="91440" bIns="45720" rtlCol="0"/>
+          <a:lstStyle>
+            <a:lvl1pPr algn="l">
+              <a:defRPr sz="1200"/>
+            </a:lvl1pPr>
+          </a:lstStyle>
+          <a:p>
+            <a:endParaRPr lang="en-US"/>
+          </a:p>
+        </p:txBody>
+      </p:sp>
+      <p:sp>
+        <p:nvSpPr>
+          <p:cNvPr id="3" name="Date Placeholder 2"/>
+          <p:cNvSpPr>
+            <a:spLocks noGrp="1"/>
+          </p:cNvSpPr>
+          <p:nvPr>
+            <p:ph type="dt" idx="1"/>
+          </p:nvPr>
+        </p:nvSpPr>
+        <p:spPr>
+          <a:xfrm>
+            <a:off x="3884613" y="0"/>
+            <a:ext cx="2971800" cy="458788"/>
+          </a:xfrm>
+          <a:prstGeom prst="rect">
+            <a:avLst/>
+          </a:prstGeom>
+        </p:spPr>
+        <p:txBody>
+          <a:bodyPr vert="horz" lIns="91440" tIns="45720" rIns="91440" bIns="45720" rtlCol="0"/>
+          <a:lstStyle>
+            <a:lvl1pPr algn="r">
+              <a:defRPr sz="1200"/>
+            </a:lvl1pPr>
+          </a:lstStyle>
+          <a:p>
+            <a:fld id="{6C3EB69D-56FD-B940-858E-C0B0567DEAD7}" type="datetimeFigureOut">
+              <a:rPr lang="en-US" smtClean="0"/>
+              <a:t>7/25/17</a:t>
+            </a:fld>
+            <a:endParaRPr lang="en-US"/>
+          </a:p>
+        </p:txBody>
+      </p:sp>
+      <p:sp>
+        <p:nvSpPr>
+          <p:cNvPr id="4" name="Slide Image Placeholder 3"/>
+          <p:cNvSpPr>
+            <a:spLocks noGrp="1" noRot="1" noChangeAspect="1"/>
+          </p:cNvSpPr>
+          <p:nvPr>
+            <p:ph type="sldImg" idx="2"/>
+          </p:nvPr>
+        </p:nvSpPr>
+        <p:spPr>
+          <a:xfrm>
+            <a:off x="1371600" y="1143000"/>
+            <a:ext cx="4114800" cy="3086100"/>
+          </a:xfrm>
+          <a:prstGeom prst="rect">
+            <a:avLst/>
+          </a:prstGeom>
+          <a:noFill/>
+          <a:ln w="12700">
+            <a:solidFill>
+              <a:prstClr val="black"/>
+            </a:solidFill>
+          </a:ln>
+        </p:spPr>
+        <p:txBody>
+          <a:bodyPr vert="horz" lIns="91440" tIns="45720" rIns="91440" bIns="45720" rtlCol="0" anchor="ctr"/>
+          <a:lstStyle/>
+          <a:p>
+            <a:endParaRPr lang="en-US"/>
+          </a:p>
+        </p:txBody>
+      </p:sp>
+      <p:sp>
+        <p:nvSpPr>
+          <p:cNvPr id="5" name="Notes Placeholder 4"/>
+          <p:cNvSpPr>
+            <a:spLocks noGrp="1"/>
+          </p:cNvSpPr>
+          <p:nvPr>
+            <p:ph type="body" sz="quarter" idx="3"/>
+          </p:nvPr>
+        </p:nvSpPr>
+        <p:spPr>
+          <a:xfrm>
+            <a:off x="685800" y="4400550"/>
+            <a:ext cx="5486400" cy="3600450"/>
+          </a:xfrm>
+          <a:prstGeom prst="rect">
+            <a:avLst/>
+          </a:prstGeom>
+        </p:spPr>
+        <p:txBody>
+          <a:bodyPr vert="horz" lIns="91440" tIns="45720" rIns="91440" bIns="45720" rtlCol="0"/>
+          <a:lstStyle/>
+          <a:p>
+            <a:pPr lvl="0"/>
+            <a:r>
+              <a:rPr lang="en-US" smtClean="0"/>
+              <a:t>Click to edit Master text styles</a:t>
+            </a:r>
+          </a:p>
+          <a:p>
+            <a:pPr lvl="1"/>
+            <a:r>
+              <a:rPr lang="en-US" smtClean="0"/>
+              <a:t>Second level</a:t>
+            </a:r>
+          </a:p>
+          <a:p>
+            <a:pPr lvl="2"/>
+            <a:r>
+              <a:rPr lang="en-US" smtClean="0"/>
+              <a:t>Third level</a:t>
+            </a:r>
+          </a:p>
+          <a:p>
+            <a:pPr lvl="3"/>
+            <a:r>
+              <a:rPr lang="en-US" smtClean="0"/>
+              <a:t>Fourth level</a:t>
+            </a:r>
+          </a:p>
+          <a:p>
+            <a:pPr lvl="4"/>
+            <a:r>
+              <a:rPr lang="en-US" smtClean="0"/>
+              <a:t>Fifth level</a:t>
+            </a:r>
+            <a:endParaRPr lang="en-US"/>
+          </a:p>
+        </p:txBody>
+      </p:sp>
+      <p:sp>
+        <p:nvSpPr>
+          <p:cNvPr id="6" name="Footer Placeholder 5"/>
+          <p:cNvSpPr>
+            <a:spLocks noGrp="1"/>
+          </p:cNvSpPr>
+          <p:nvPr>
+            <p:ph type="ftr" sz="quarter" idx="4"/>
+          </p:nvPr>
+        </p:nvSpPr>
+        <p:spPr>
+          <a:xfrm>
+            <a:off x="0" y="8685213"/>
+            <a:ext cx="2971800" cy="458787"/>
+          </a:xfrm>
+          <a:prstGeom prst="rect">
+            <a:avLst/>
+          </a:prstGeom>
+        </p:spPr>
+        <p:txBody>
+          <a:bodyPr vert="horz" lIns="91440" tIns="45720" rIns="91440" bIns="45720" rtlCol="0" anchor="b"/>
+          <a:lstStyle>
+            <a:lvl1pPr algn="l">
+              <a:defRPr sz="1200"/>
+            </a:lvl1pPr>
+          </a:lstStyle>
+          <a:p>
+            <a:endParaRPr lang="en-US"/>
+          </a:p>
+        </p:txBody>
+      </p:sp>
+      <p:sp>
+        <p:nvSpPr>
+          <p:cNvPr id="7" name="Slide Number Placeholder 6"/>
+          <p:cNvSpPr>
+            <a:spLocks noGrp="1"/>
+          </p:cNvSpPr>
+          <p:nvPr>
+            <p:ph type="sldNum" sz="quarter" idx="5"/>
+          </p:nvPr>
+        </p:nvSpPr>
+        <p:spPr>
+          <a:xfrm>
+            <a:off x="3884613" y="8685213"/>
+            <a:ext cx="2971800" cy="458787"/>
+          </a:xfrm>
+          <a:prstGeom prst="rect">
+            <a:avLst/>
+          </a:prstGeom>
+        </p:spPr>
+        <p:txBody>
+          <a:bodyPr vert="horz" lIns="91440" tIns="45720" rIns="91440" bIns="45720" rtlCol="0" anchor="b"/>
+          <a:lstStyle>
+            <a:lvl1pPr algn="r">
+              <a:defRPr sz="1200"/>
+            </a:lvl1pPr>
+          </a:lstStyle>
+          <a:p>
+            <a:fld id="{7B193B41-92C1-874C-8F58-0EB80467278A}" type="slidenum">
+              <a:rPr lang="en-US" smtClean="0"/>
+              <a:t>‹#›</a:t>
+            </a:fld>
+            <a:endParaRPr lang="en-US"/>
+          </a:p>
+        </p:txBody>
+      </p:sp>
+    </p:spTree>
+    <p:extLst>
+      <p:ext uri="{BB962C8B-B14F-4D97-AF65-F5344CB8AC3E}">
+        <p14:creationId xmlns:p14="http://schemas.microsoft.com/office/powerpoint/2010/main" val="722879648"/>
+      </p:ext>
+    </p:extLst>
+  </p:cSld>
+  <p:clrMap bg1="lt1" tx1="dk1" bg2="lt2" tx2="dk2" accent1="accent1" accent2="accent2" accent3="accent3" accent4="accent4" accent5="accent5" accent6="accent6" hlink="hlink" folHlink="folHlink"/>
+  <p:notesStyle>
+    <a:lvl1pPr marL="0" algn="l" defTabSz="914400" rtl="0" eaLnBrk="1" latinLnBrk="0" hangingPunct="1">
+      <a:defRPr sz="1200" kern="1200">
+        <a:solidFill>
+          <a:schemeClr val="tx1"/>
+        </a:solidFill>
+        <a:latin typeface="+mn-lt"/>
+        <a:ea typeface="+mn-ea"/>
+        <a:cs typeface="+mn-cs"/>
+      </a:defRPr>
+    </a:lvl1pPr>
+    <a:lvl2pPr marL="457200" algn="l" defTabSz="914400" rtl="0" eaLnBrk="1" latinLnBrk="0" hangingPunct="1">
+      <a:defRPr sz="1200" kern="1200">
+        <a:solidFill>
+          <a:schemeClr val="tx1"/>
+        </a:solidFill>
+        <a:latin typeface="+mn-lt"/>
+        <a:ea typeface="+mn-ea"/>
+        <a:cs typeface="+mn-cs"/>
+      </a:defRPr>
+    </a:lvl2pPr>
+    <a:lvl3pPr marL="914400" algn="l" defTabSz="914400" rtl="0" eaLnBrk="1" latinLnBrk="0" hangingPunct="1">
+      <a:defRPr sz="1200" kern="1200">
+        <a:solidFill>
+          <a:schemeClr val="tx1"/>
+        </a:solidFill>
+        <a:latin typeface="+mn-lt"/>
+        <a:ea typeface="+mn-ea"/>
+        <a:cs typeface="+mn-cs"/>
+      </a:defRPr>
+    </a:lvl3pPr>
+    <a:lvl4pPr marL="1371600" algn="l" defTabSz="914400" rtl="0" eaLnBrk="1" latinLnBrk="0" hangingPunct="1">
+      <a:defRPr sz="1200" kern="1200">
+        <a:solidFill>
+          <a:schemeClr val="tx1"/>
+        </a:solidFill>
+        <a:latin typeface="+mn-lt"/>
+        <a:ea typeface="+mn-ea"/>
+        <a:cs typeface="+mn-cs"/>
+      </a:defRPr>
+    </a:lvl4pPr>
+    <a:lvl5pPr marL="1828800" algn="l" defTabSz="914400" rtl="0" eaLnBrk="1" latinLnBrk="0" hangingPunct="1">
+      <a:defRPr sz="1200" kern="1200">
+        <a:solidFill>
+          <a:schemeClr val="tx1"/>
+        </a:solidFill>
+        <a:latin typeface="+mn-lt"/>
+        <a:ea typeface="+mn-ea"/>
+        <a:cs typeface="+mn-cs"/>
+      </a:defRPr>
+    </a:lvl5pPr>
+    <a:lvl6pPr marL="2286000" algn="l" defTabSz="914400" rtl="0" eaLnBrk="1" latinLnBrk="0" hangingPunct="1">
+      <a:defRPr sz="1200" kern="1200">
+        <a:solidFill>
+          <a:schemeClr val="tx1"/>
+        </a:solidFill>
+        <a:latin typeface="+mn-lt"/>
+        <a:ea typeface="+mn-ea"/>
+        <a:cs typeface="+mn-cs"/>
+      </a:defRPr>
+    </a:lvl6pPr>
+    <a:lvl7pPr marL="2743200" algn="l" defTabSz="914400" rtl="0" eaLnBrk="1" latinLnBrk="0" hangingPunct="1">
+      <a:defRPr sz="1200" kern="1200">
+        <a:solidFill>
+          <a:schemeClr val="tx1"/>
+        </a:solidFill>
+        <a:latin typeface="+mn-lt"/>
+        <a:ea typeface="+mn-ea"/>
+        <a:cs typeface="+mn-cs"/>
+      </a:defRPr>
+    </a:lvl7pPr>
+    <a:lvl8pPr marL="3200400" algn="l" defTabSz="914400" rtl="0" eaLnBrk="1" latinLnBrk="0" hangingPunct="1">
+      <a:defRPr sz="1200" kern="1200">
+        <a:solidFill>
+          <a:schemeClr val="tx1"/>
+        </a:solidFill>
+        <a:latin typeface="+mn-lt"/>
+        <a:ea typeface="+mn-ea"/>
+        <a:cs typeface="+mn-cs"/>
+      </a:defRPr>
+    </a:lvl8pPr>
+    <a:lvl9pPr marL="3657600" algn="l" defTabSz="914400" rtl="0" eaLnBrk="1" latinLnBrk="0" hangingPunct="1">
+      <a:defRPr sz="1200" kern="1200">
+        <a:solidFill>
+          <a:schemeClr val="tx1"/>
+        </a:solidFill>
+        <a:latin typeface="+mn-lt"/>
+        <a:ea typeface="+mn-ea"/>
+        <a:cs typeface="+mn-cs"/>
+      </a:defRPr>
+    </a:lvl9pPr>
+  </p:notesStyle>
+</p:notesMaster>
+</file>
+
+<file path=ppt/notesSlides/notesSlide1.xml><?xml version="1.0" encoding="utf-8"?>
+<p:notes xmlns:a="http://schemas.openxmlformats.org/drawingml/2006/main" xmlns:r="http://schemas.openxmlformats.org/officeDocument/2006/relationships" xmlns:p="http://schemas.openxmlformats.org/presentationml/2006/main">
+  <p:cSld>
+    <p:spTree>
+      <p:nvGrpSpPr>
+        <p:cNvPr id="1" name=""/>
+        <p:cNvGrpSpPr/>
+        <p:nvPr/>
+      </p:nvGrpSpPr>
+      <p:grpSpPr>
+        <a:xfrm>
+          <a:off x="0" y="0"/>
+          <a:ext cx="0" cy="0"/>
+          <a:chOff x="0" y="0"/>
+          <a:chExt cx="0" cy="0"/>
+        </a:xfrm>
+      </p:grpSpPr>
+      <p:sp>
+        <p:nvSpPr>
+          <p:cNvPr id="2" name="Slide Image Placeholder 1"/>
+          <p:cNvSpPr>
+            <a:spLocks noGrp="1" noRot="1" noChangeAspect="1"/>
+          </p:cNvSpPr>
+          <p:nvPr>
+            <p:ph type="sldImg"/>
+          </p:nvPr>
+        </p:nvSpPr>
+        <p:spPr/>
+      </p:sp>
+      <p:sp>
+        <p:nvSpPr>
+          <p:cNvPr id="3" name="Notes Placeholder 2"/>
+          <p:cNvSpPr>
+            <a:spLocks noGrp="1"/>
+          </p:cNvSpPr>
+          <p:nvPr>
+            <p:ph type="body" idx="1"/>
+          </p:nvPr>
+        </p:nvSpPr>
+        <p:spPr/>
+        <p:txBody>
+          <a:bodyPr/>
+          <a:lstStyle/>
+          <a:p>
+            <a:endParaRPr lang="en-US"/>
+          </a:p>
+        </p:txBody>
+      </p:sp>
+      <p:sp>
+        <p:nvSpPr>
+          <p:cNvPr id="4" name="Slide Number Placeholder 3"/>
+          <p:cNvSpPr>
+            <a:spLocks noGrp="1"/>
+          </p:cNvSpPr>
+          <p:nvPr>
+            <p:ph type="sldNum" sz="quarter" idx="10"/>
+          </p:nvPr>
+        </p:nvSpPr>
+        <p:spPr/>
+        <p:txBody>
+          <a:bodyPr/>
+          <a:lstStyle/>
+          <a:p>
+            <a:fld id="{7B193B41-92C1-874C-8F58-0EB80467278A}" type="slidenum">
+              <a:rPr lang="en-US" smtClean="0"/>
+              <a:t>1</a:t>
+            </a:fld>
+            <a:endParaRPr lang="en-US"/>
+          </a:p>
+        </p:txBody>
+      </p:sp>
+    </p:spTree>
+    <p:extLst>
+      <p:ext uri="{BB962C8B-B14F-4D97-AF65-F5344CB8AC3E}">
+        <p14:creationId xmlns:p14="http://schemas.microsoft.com/office/powerpoint/2010/main" val="698674027"/>
+      </p:ext>
+    </p:extLst>
+  </p:cSld>
+  <p:clrMapOvr>
+    <a:masterClrMapping/>
+  </p:clrMapOvr>
+</p:notes>
+</file>
+
 <file path=ppt/slideLayouts/slideLayout1.xml><?xml version="1.0" encoding="utf-8"?>
 <p:sldLayout xmlns:a="http://schemas.openxmlformats.org/drawingml/2006/main" xmlns:r="http://schemas.openxmlformats.org/officeDocument/2006/relationships" xmlns:p="http://schemas.openxmlformats.org/presentationml/2006/main" type="title" preserve="1">
   <p:cSld name="Title Slide">
@@ -247,9 +686,9 @@
           <a:bodyPr/>
           <a:lstStyle/>
           <a:p>
-            <a:fld id="{6F3CC67E-E758-4466-B509-7A2C10E91C78}" type="datetimeFigureOut">
-              <a:rPr lang="en-US" smtClean="0"/>
-              <a:t>7/14/2015</a:t>
+            <a:fld id="{3952960A-E554-A346-9828-795EA0E7B1D6}" type="datetime1">
+              <a:rPr lang="en-US" smtClean="0"/>
+              <a:t>7/25/17</a:t>
             </a:fld>
             <a:endParaRPr lang="en-US"/>
           </a:p>
@@ -417,9 +856,9 @@
           <a:bodyPr/>
           <a:lstStyle/>
           <a:p>
-            <a:fld id="{6F3CC67E-E758-4466-B509-7A2C10E91C78}" type="datetimeFigureOut">
-              <a:rPr lang="en-US" smtClean="0"/>
-              <a:t>7/14/2015</a:t>
+            <a:fld id="{66EE937B-1BE4-A346-A520-4B75E366E12B}" type="datetime1">
+              <a:rPr lang="en-US" smtClean="0"/>
+              <a:t>7/25/17</a:t>
             </a:fld>
             <a:endParaRPr lang="en-US"/>
           </a:p>
@@ -597,9 +1036,9 @@
           <a:bodyPr/>
           <a:lstStyle/>
           <a:p>
-            <a:fld id="{6F3CC67E-E758-4466-B509-7A2C10E91C78}" type="datetimeFigureOut">
-              <a:rPr lang="en-US" smtClean="0"/>
-              <a:t>7/14/2015</a:t>
+            <a:fld id="{3BF5190D-3832-BE47-8EC0-77E2640E7E53}" type="datetime1">
+              <a:rPr lang="en-US" smtClean="0"/>
+              <a:t>7/25/17</a:t>
             </a:fld>
             <a:endParaRPr lang="en-US"/>
           </a:p>
@@ -772,9 +1211,9 @@
           <a:bodyPr/>
           <a:lstStyle/>
           <a:p>
-            <a:fld id="{6F3CC67E-E758-4466-B509-7A2C10E91C78}" type="datetimeFigureOut">
-              <a:rPr lang="en-US" smtClean="0"/>
-              <a:t>7/14/2015</a:t>
+            <a:fld id="{65684974-4E7E-3643-8872-D073F61491FB}" type="datetime1">
+              <a:rPr lang="en-US" smtClean="0"/>
+              <a:t>7/25/17</a:t>
             </a:fld>
             <a:endParaRPr lang="en-US"/>
           </a:p>
@@ -1016,9 +1455,9 @@
           <a:bodyPr/>
           <a:lstStyle/>
           <a:p>
-            <a:fld id="{6F3CC67E-E758-4466-B509-7A2C10E91C78}" type="datetimeFigureOut">
-              <a:rPr lang="en-US" smtClean="0"/>
-              <a:t>7/14/2015</a:t>
+            <a:fld id="{844A2058-6E81-4E4B-A005-7F0B9B2338B4}" type="datetime1">
+              <a:rPr lang="en-US" smtClean="0"/>
+              <a:t>7/25/17</a:t>
             </a:fld>
             <a:endParaRPr lang="en-US"/>
           </a:p>
@@ -1248,9 +1687,9 @@
           <a:bodyPr/>
           <a:lstStyle/>
           <a:p>
-            <a:fld id="{6F3CC67E-E758-4466-B509-7A2C10E91C78}" type="datetimeFigureOut">
-              <a:rPr lang="en-US" smtClean="0"/>
-              <a:t>7/14/2015</a:t>
+            <a:fld id="{21580143-134D-9942-9B32-01CB3FBD4E68}" type="datetime1">
+              <a:rPr lang="en-US" smtClean="0"/>
+              <a:t>7/25/17</a:t>
             </a:fld>
             <a:endParaRPr lang="en-US"/>
           </a:p>
@@ -1615,9 +2054,9 @@
           <a:bodyPr/>
           <a:lstStyle/>
           <a:p>
-            <a:fld id="{6F3CC67E-E758-4466-B509-7A2C10E91C78}" type="datetimeFigureOut">
-              <a:rPr lang="en-US" smtClean="0"/>
-              <a:t>7/14/2015</a:t>
+            <a:fld id="{A1B8A7BE-6E7B-5F4B-80B9-F6F137A91CFE}" type="datetime1">
+              <a:rPr lang="en-US" smtClean="0"/>
+              <a:t>7/25/17</a:t>
             </a:fld>
             <a:endParaRPr lang="en-US"/>
           </a:p>
@@ -1733,9 +2172,9 @@
           <a:bodyPr/>
           <a:lstStyle/>
           <a:p>
-            <a:fld id="{6F3CC67E-E758-4466-B509-7A2C10E91C78}" type="datetimeFigureOut">
-              <a:rPr lang="en-US" smtClean="0"/>
-              <a:t>7/14/2015</a:t>
+            <a:fld id="{471CD273-268D-2A41-81FF-69786112199E}" type="datetime1">
+              <a:rPr lang="en-US" smtClean="0"/>
+              <a:t>7/25/17</a:t>
             </a:fld>
             <a:endParaRPr lang="en-US"/>
           </a:p>
@@ -1828,9 +2267,9 @@
           <a:bodyPr/>
           <a:lstStyle/>
           <a:p>
-            <a:fld id="{6F3CC67E-E758-4466-B509-7A2C10E91C78}" type="datetimeFigureOut">
-              <a:rPr lang="en-US" smtClean="0"/>
-              <a:t>7/14/2015</a:t>
+            <a:fld id="{3067256E-511A-4742-ADE9-A5FD5C44117C}" type="datetime1">
+              <a:rPr lang="en-US" smtClean="0"/>
+              <a:t>7/25/17</a:t>
             </a:fld>
             <a:endParaRPr lang="en-US"/>
           </a:p>
@@ -2105,9 +2544,9 @@
           <a:bodyPr/>
           <a:lstStyle/>
           <a:p>
-            <a:fld id="{6F3CC67E-E758-4466-B509-7A2C10E91C78}" type="datetimeFigureOut">
-              <a:rPr lang="en-US" smtClean="0"/>
-              <a:t>7/14/2015</a:t>
+            <a:fld id="{C1D6E9F1-0DEE-4F4F-85D6-498AD9A366F5}" type="datetime1">
+              <a:rPr lang="en-US" smtClean="0"/>
+              <a:t>7/25/17</a:t>
             </a:fld>
             <a:endParaRPr lang="en-US"/>
           </a:p>
@@ -2362,9 +2801,9 @@
           <a:bodyPr/>
           <a:lstStyle/>
           <a:p>
-            <a:fld id="{6F3CC67E-E758-4466-B509-7A2C10E91C78}" type="datetimeFigureOut">
-              <a:rPr lang="en-US" smtClean="0"/>
-              <a:t>7/14/2015</a:t>
+            <a:fld id="{5CB42412-C5AB-104D-A902-7E42A6A5A092}" type="datetime1">
+              <a:rPr lang="en-US" smtClean="0"/>
+              <a:t>7/25/17</a:t>
             </a:fld>
             <a:endParaRPr lang="en-US"/>
           </a:p>
@@ -2575,9 +3014,9 @@
             </a:lvl1pPr>
           </a:lstStyle>
           <a:p>
-            <a:fld id="{6F3CC67E-E758-4466-B509-7A2C10E91C78}" type="datetimeFigureOut">
-              <a:rPr lang="en-US" smtClean="0"/>
-              <a:t>7/14/2015</a:t>
+            <a:fld id="{1DF15A24-8F15-C347-993E-C3C693520288}" type="datetime1">
+              <a:rPr lang="en-US" smtClean="0"/>
+              <a:t>7/25/17</a:t>
             </a:fld>
             <a:endParaRPr lang="en-US"/>
           </a:p>
@@ -2723,6 +3162,7 @@
     <p:sldLayoutId id="2147483670" r:id="rId10"/>
     <p:sldLayoutId id="2147483671" r:id="rId11"/>
   </p:sldLayoutIdLst>
+  <p:hf hdr="0" ftr="0" dt="0"/>
   <p:txStyles>
     <p:titleStyle>
       <a:lvl1pPr algn="l" defTabSz="914400" rtl="0" eaLnBrk="1" latinLnBrk="0" hangingPunct="1">
@@ -3044,7 +3484,7 @@
           <a:lstStyle/>
           <a:p>
             <a:r>
-              <a:rPr lang="en-US" dirty="0" smtClean="0">
+              <a:rPr lang="en-US" b="1" dirty="0" smtClean="0">
                 <a:solidFill>
                   <a:srgbClr val="0070C0"/>
                 </a:solidFill>
@@ -3052,21 +3492,21 @@
               <a:t>What is </a:t>
             </a:r>
             <a:br>
-              <a:rPr lang="en-US" dirty="0" smtClean="0">
+              <a:rPr lang="en-US" b="1" dirty="0" smtClean="0">
                 <a:solidFill>
                   <a:srgbClr val="0070C0"/>
                 </a:solidFill>
               </a:rPr>
             </a:br>
             <a:r>
-              <a:rPr lang="en-US" dirty="0" smtClean="0">
+              <a:rPr lang="en-US" b="1" dirty="0" smtClean="0">
                 <a:solidFill>
                   <a:srgbClr val="0070C0"/>
                 </a:solidFill>
               </a:rPr>
               <a:t>FIRST LEGO LEAGUE?</a:t>
             </a:r>
-            <a:endParaRPr lang="en-US" dirty="0">
+            <a:endParaRPr lang="en-US" b="1" dirty="0">
               <a:solidFill>
                 <a:srgbClr val="0070C0"/>
               </a:solidFill>
@@ -3074,45 +3514,119 @@
           </a:p>
         </p:txBody>
       </p:sp>
-      <p:pic>
-        <p:nvPicPr>
-          <p:cNvPr id="1026" name="Picture 2" descr="http://www.usfirst.org/sites/default/files/uploadedImages/Robotics_Programs/FRC/FRC_Communications_Resource_Center/Branding_and_Logos/FLLicon_RGB.png"/>
-          <p:cNvPicPr>
-            <a:picLocks noChangeAspect="1" noChangeArrowheads="1"/>
-          </p:cNvPicPr>
+      <p:sp>
+        <p:nvSpPr>
+          <p:cNvPr id="3" name="TextBox 2"/>
+          <p:cNvSpPr txBox="1"/>
           <p:nvPr/>
-        </p:nvPicPr>
-        <p:blipFill>
-          <a:blip r:embed="rId2" cstate="screen">
-            <a:extLst>
-              <a:ext uri="{28A0092B-C50C-407E-A947-70E740481C1C}">
-                <a14:useLocalDpi xmlns:a14="http://schemas.microsoft.com/office/drawing/2010/main" val="0"/>
-              </a:ext>
-            </a:extLst>
-          </a:blip>
-          <a:srcRect/>
-          <a:stretch>
-            <a:fillRect/>
-          </a:stretch>
-        </p:blipFill>
-        <p:spPr bwMode="auto">
+        </p:nvSpPr>
+        <p:spPr>
           <a:xfrm>
-            <a:off x="3267855" y="3092372"/>
-            <a:ext cx="2578308" cy="2716509"/>
+            <a:off x="2035449" y="5051658"/>
+            <a:ext cx="4833257" cy="461665"/>
           </a:xfrm>
           <a:prstGeom prst="rect">
             <a:avLst/>
           </a:prstGeom>
           <a:noFill/>
-          <a:extLst>
-            <a:ext uri="{909E8E84-426E-40DD-AFC4-6F175D3DCCD1}">
-              <a14:hiddenFill xmlns:a14="http://schemas.microsoft.com/office/drawing/2010/main">
-                <a:solidFill>
-                  <a:srgbClr val="FFFFFF"/>
-                </a:solidFill>
-              </a14:hiddenFill>
-            </a:ext>
-          </a:extLst>
+        </p:spPr>
+        <p:txBody>
+          <a:bodyPr wrap="square" rtlCol="0">
+            <a:spAutoFit/>
+          </a:bodyPr>
+          <a:lstStyle/>
+          <a:p>
+            <a:pPr algn="ctr"/>
+            <a:r>
+              <a:rPr lang="en-US" sz="2400" dirty="0" smtClean="0"/>
+              <a:t>By Sanjay and Arvind Seshan</a:t>
+            </a:r>
+            <a:endParaRPr lang="en-US" sz="2400" dirty="0"/>
+          </a:p>
+        </p:txBody>
+      </p:sp>
+      <p:pic>
+        <p:nvPicPr>
+          <p:cNvPr id="4" name="Picture 3"/>
+          <p:cNvPicPr>
+            <a:picLocks noChangeAspect="1"/>
+          </p:cNvPicPr>
+          <p:nvPr/>
+        </p:nvPicPr>
+        <p:blipFill>
+          <a:blip r:embed="rId3" cstate="print">
+            <a:extLst>
+              <a:ext uri="{28A0092B-C50C-407E-A947-70E740481C1C}">
+                <a14:useLocalDpi xmlns:a14="http://schemas.microsoft.com/office/drawing/2010/main"/>
+              </a:ext>
+            </a:extLst>
+          </a:blip>
+          <a:stretch>
+            <a:fillRect/>
+          </a:stretch>
+        </p:blipFill>
+        <p:spPr>
+          <a:xfrm>
+            <a:off x="2917502" y="5589893"/>
+            <a:ext cx="1715919" cy="583412"/>
+          </a:xfrm>
+          <a:prstGeom prst="rect">
+            <a:avLst/>
+          </a:prstGeom>
+        </p:spPr>
+      </p:pic>
+      <p:pic>
+        <p:nvPicPr>
+          <p:cNvPr id="5" name="Picture 4"/>
+          <p:cNvPicPr>
+            <a:picLocks noChangeAspect="1"/>
+          </p:cNvPicPr>
+          <p:nvPr/>
+        </p:nvPicPr>
+        <p:blipFill>
+          <a:blip r:embed="rId4" cstate="print">
+            <a:extLst>
+              <a:ext uri="{28A0092B-C50C-407E-A947-70E740481C1C}">
+                <a14:useLocalDpi xmlns:a14="http://schemas.microsoft.com/office/drawing/2010/main"/>
+              </a:ext>
+            </a:extLst>
+          </a:blip>
+          <a:stretch>
+            <a:fillRect/>
+          </a:stretch>
+        </p:blipFill>
+        <p:spPr>
+          <a:xfrm>
+            <a:off x="4973272" y="5513323"/>
+            <a:ext cx="1047518" cy="636891"/>
+          </a:xfrm>
+          <a:prstGeom prst="rect">
+            <a:avLst/>
+          </a:prstGeom>
+        </p:spPr>
+      </p:pic>
+      <p:pic>
+        <p:nvPicPr>
+          <p:cNvPr id="6" name="Picture 5"/>
+          <p:cNvPicPr>
+            <a:picLocks noChangeAspect="1"/>
+          </p:cNvPicPr>
+          <p:nvPr/>
+        </p:nvPicPr>
+        <p:blipFill>
+          <a:blip r:embed="rId5"/>
+          <a:stretch>
+            <a:fillRect/>
+          </a:stretch>
+        </p:blipFill>
+        <p:spPr>
+          <a:xfrm>
+            <a:off x="3579863" y="2697798"/>
+            <a:ext cx="1744428" cy="2072588"/>
+          </a:xfrm>
+          <a:prstGeom prst="rect">
+            <a:avLst/>
+          </a:prstGeom>
         </p:spPr>
       </p:pic>
     </p:spTree>
@@ -3161,14 +3675,14 @@
           <a:lstStyle/>
           <a:p>
             <a:r>
-              <a:rPr lang="en-US" dirty="0" smtClean="0">
+              <a:rPr lang="en-US" b="1" dirty="0" smtClean="0">
                 <a:solidFill>
                   <a:srgbClr val="0070C0"/>
                 </a:solidFill>
               </a:rPr>
-              <a:t>FLL Overview</a:t>
-            </a:r>
-            <a:endParaRPr lang="en-US" dirty="0">
+              <a:t>FIRST LEGO League Overview</a:t>
+            </a:r>
+            <a:endParaRPr lang="en-US" b="1" dirty="0">
               <a:solidFill>
                 <a:srgbClr val="0070C0"/>
               </a:solidFill>
@@ -3217,7 +3731,7 @@
           <a:p>
             <a:r>
               <a:rPr lang="en-US" sz="2400" dirty="0" smtClean="0"/>
-              <a:t>About 27,000 students in over 80 countries participate in FLL</a:t>
+              <a:t>About 29,000 students in over 80 countries participate in FLL</a:t>
             </a:r>
           </a:p>
           <a:p>
@@ -3238,14 +3752,14 @@
           <p:nvPr/>
         </p:nvPicPr>
         <p:blipFill rotWithShape="1">
-          <a:blip r:embed="rId2">
+          <a:blip r:embed="rId2" cstate="print">
             <a:extLst>
               <a:ext uri="{28A0092B-C50C-407E-A947-70E740481C1C}">
-                <a14:useLocalDpi xmlns:a14="http://schemas.microsoft.com/office/drawing/2010/main" val="0"/>
+                <a14:useLocalDpi xmlns:a14="http://schemas.microsoft.com/office/drawing/2010/main"/>
               </a:ext>
             </a:extLst>
           </a:blip>
-          <a:srcRect l="16584" r="29520"/>
+          <a:srcRect/>
           <a:stretch/>
         </p:blipFill>
         <p:spPr bwMode="auto">
@@ -3280,7 +3794,7 @@
           <a:blip r:embed="rId3" cstate="screen">
             <a:extLst>
               <a:ext uri="{28A0092B-C50C-407E-A947-70E740481C1C}">
-                <a14:useLocalDpi xmlns:a14="http://schemas.microsoft.com/office/drawing/2010/main" val="0"/>
+                <a14:useLocalDpi xmlns:a14="http://schemas.microsoft.com/office/drawing/2010/main"/>
               </a:ext>
             </a:extLst>
           </a:blip>
@@ -3318,10 +3832,10 @@
           <p:nvPr/>
         </p:nvPicPr>
         <p:blipFill rotWithShape="1">
-          <a:blip r:embed="rId4">
+          <a:blip r:embed="rId4" cstate="print">
             <a:extLst>
               <a:ext uri="{28A0092B-C50C-407E-A947-70E740481C1C}">
-                <a14:useLocalDpi xmlns:a14="http://schemas.microsoft.com/office/drawing/2010/main" val="0"/>
+                <a14:useLocalDpi xmlns:a14="http://schemas.microsoft.com/office/drawing/2010/main"/>
               </a:ext>
             </a:extLst>
           </a:blip>
@@ -3348,6 +3862,29 @@
           </a:extLst>
         </p:spPr>
       </p:pic>
+      <p:sp>
+        <p:nvSpPr>
+          <p:cNvPr id="7" name="Slide Number Placeholder 6"/>
+          <p:cNvSpPr>
+            <a:spLocks noGrp="1"/>
+          </p:cNvSpPr>
+          <p:nvPr>
+            <p:ph type="sldNum" sz="quarter" idx="12"/>
+          </p:nvPr>
+        </p:nvSpPr>
+        <p:spPr/>
+        <p:txBody>
+          <a:bodyPr/>
+          <a:lstStyle/>
+          <a:p>
+            <a:fld id="{8AE9E5C2-A58E-4F36-B7BD-0EB00048A08B}" type="slidenum">
+              <a:rPr lang="en-US" smtClean="0"/>
+              <a:t>2</a:t>
+            </a:fld>
+            <a:endParaRPr lang="en-US"/>
+          </a:p>
+        </p:txBody>
+      </p:sp>
     </p:spTree>
     <p:extLst>
       <p:ext uri="{BB962C8B-B14F-4D97-AF65-F5344CB8AC3E}">
@@ -3394,53 +3931,18 @@
           <a:lstStyle/>
           <a:p>
             <a:r>
-              <a:rPr lang="en-US" dirty="0" smtClean="0">
+              <a:rPr lang="en-US" b="1" dirty="0" smtClean="0">
                 <a:solidFill>
                   <a:srgbClr val="0070C0"/>
                 </a:solidFill>
               </a:rPr>
-              <a:t>Three Parts to FLL</a:t>
-            </a:r>
-            <a:endParaRPr lang="en-US" dirty="0">
+              <a:t>Three Parts to FIRST LEGO League</a:t>
+            </a:r>
+            <a:endParaRPr lang="en-US" b="1" dirty="0">
               <a:solidFill>
                 <a:srgbClr val="0070C0"/>
               </a:solidFill>
             </a:endParaRPr>
-          </a:p>
-        </p:txBody>
-      </p:sp>
-      <p:sp>
-        <p:nvSpPr>
-          <p:cNvPr id="3" name="Content Placeholder 2"/>
-          <p:cNvSpPr>
-            <a:spLocks noGrp="1"/>
-          </p:cNvSpPr>
-          <p:nvPr>
-            <p:ph idx="1"/>
-          </p:nvPr>
-        </p:nvSpPr>
-        <p:spPr/>
-        <p:txBody>
-          <a:bodyPr/>
-          <a:lstStyle/>
-          <a:p>
-            <a:r>
-              <a:rPr lang="en-US" dirty="0" smtClean="0"/>
-              <a:t>Robot Game</a:t>
-            </a:r>
-          </a:p>
-          <a:p>
-            <a:r>
-              <a:rPr lang="en-US" dirty="0" smtClean="0"/>
-              <a:t>Research Project</a:t>
-            </a:r>
-          </a:p>
-          <a:p>
-            <a:r>
-              <a:rPr lang="en-US" dirty="0" smtClean="0"/>
-              <a:t>Core Values</a:t>
-            </a:r>
-            <a:endParaRPr lang="en-US" dirty="0"/>
           </a:p>
         </p:txBody>
       </p:sp>
@@ -3456,7 +3958,7 @@
           <a:blip r:embed="rId2">
             <a:extLst>
               <a:ext uri="{28A0092B-C50C-407E-A947-70E740481C1C}">
-                <a14:useLocalDpi xmlns:a14="http://schemas.microsoft.com/office/drawing/2010/main" val="0"/>
+                <a14:useLocalDpi xmlns:a14="http://schemas.microsoft.com/office/drawing/2010/main"/>
               </a:ext>
             </a:extLst>
           </a:blip>
@@ -3467,7 +3969,7 @@
         </p:blipFill>
         <p:spPr bwMode="auto">
           <a:xfrm>
-            <a:off x="3597639" y="2026530"/>
+            <a:off x="1970719" y="1825625"/>
             <a:ext cx="4784361" cy="4150433"/>
           </a:xfrm>
           <a:prstGeom prst="rect">
@@ -3485,6 +3987,119 @@
           </a:extLst>
         </p:spPr>
       </p:pic>
+      <p:sp>
+        <p:nvSpPr>
+          <p:cNvPr id="4" name="TextBox 3"/>
+          <p:cNvSpPr txBox="1"/>
+          <p:nvPr/>
+        </p:nvSpPr>
+        <p:spPr>
+          <a:xfrm>
+            <a:off x="6449044" y="4227615"/>
+            <a:ext cx="2066306" cy="1077218"/>
+          </a:xfrm>
+          <a:prstGeom prst="rect">
+            <a:avLst/>
+          </a:prstGeom>
+          <a:noFill/>
+        </p:spPr>
+        <p:txBody>
+          <a:bodyPr wrap="square" rtlCol="0">
+            <a:spAutoFit/>
+          </a:bodyPr>
+          <a:lstStyle/>
+          <a:p>
+            <a:r>
+              <a:rPr lang="en-US" sz="3200" b="1" smtClean="0"/>
+              <a:t>Research Project</a:t>
+            </a:r>
+            <a:endParaRPr lang="en-US" sz="3200" b="1"/>
+          </a:p>
+        </p:txBody>
+      </p:sp>
+      <p:sp>
+        <p:nvSpPr>
+          <p:cNvPr id="6" name="TextBox 5"/>
+          <p:cNvSpPr txBox="1"/>
+          <p:nvPr/>
+        </p:nvSpPr>
+        <p:spPr>
+          <a:xfrm>
+            <a:off x="1186932" y="4073234"/>
+            <a:ext cx="2066306" cy="1077218"/>
+          </a:xfrm>
+          <a:prstGeom prst="rect">
+            <a:avLst/>
+          </a:prstGeom>
+          <a:noFill/>
+        </p:spPr>
+        <p:txBody>
+          <a:bodyPr wrap="square" rtlCol="0">
+            <a:spAutoFit/>
+          </a:bodyPr>
+          <a:lstStyle/>
+          <a:p>
+            <a:r>
+              <a:rPr lang="en-US" sz="3200" b="1" dirty="0" smtClean="0"/>
+              <a:t>Robot Game</a:t>
+            </a:r>
+            <a:endParaRPr lang="en-US" sz="3200" b="1" dirty="0"/>
+          </a:p>
+        </p:txBody>
+      </p:sp>
+      <p:sp>
+        <p:nvSpPr>
+          <p:cNvPr id="7" name="TextBox 6"/>
+          <p:cNvSpPr txBox="1"/>
+          <p:nvPr/>
+        </p:nvSpPr>
+        <p:spPr>
+          <a:xfrm>
+            <a:off x="5163044" y="2076200"/>
+            <a:ext cx="2066306" cy="1077218"/>
+          </a:xfrm>
+          <a:prstGeom prst="rect">
+            <a:avLst/>
+          </a:prstGeom>
+          <a:noFill/>
+        </p:spPr>
+        <p:txBody>
+          <a:bodyPr wrap="square" rtlCol="0">
+            <a:spAutoFit/>
+          </a:bodyPr>
+          <a:lstStyle/>
+          <a:p>
+            <a:r>
+              <a:rPr lang="en-US" sz="3200" b="1" dirty="0" smtClean="0"/>
+              <a:t>Core Values</a:t>
+            </a:r>
+            <a:endParaRPr lang="en-US" sz="3200" b="1" dirty="0"/>
+          </a:p>
+        </p:txBody>
+      </p:sp>
+      <p:sp>
+        <p:nvSpPr>
+          <p:cNvPr id="8" name="Slide Number Placeholder 7"/>
+          <p:cNvSpPr>
+            <a:spLocks noGrp="1"/>
+          </p:cNvSpPr>
+          <p:nvPr>
+            <p:ph type="sldNum" sz="quarter" idx="12"/>
+          </p:nvPr>
+        </p:nvSpPr>
+        <p:spPr/>
+        <p:txBody>
+          <a:bodyPr/>
+          <a:lstStyle/>
+          <a:p>
+            <a:fld id="{8AE9E5C2-A58E-4F36-B7BD-0EB00048A08B}" type="slidenum">
+              <a:rPr lang="en-US" smtClean="0"/>
+              <a:t>3</a:t>
+            </a:fld>
+            <a:endParaRPr lang="en-US"/>
+          </a:p>
+        </p:txBody>
+      </p:sp>
     </p:spTree>
     <p:extLst>
       <p:ext uri="{BB962C8B-B14F-4D97-AF65-F5344CB8AC3E}">
@@ -3524,14 +4139,14 @@
           <p:nvPr/>
         </p:nvPicPr>
         <p:blipFill rotWithShape="1">
-          <a:blip r:embed="rId2" cstate="screen">
+          <a:blip r:embed="rId2" cstate="print">
             <a:extLst>
               <a:ext uri="{28A0092B-C50C-407E-A947-70E740481C1C}">
-                <a14:useLocalDpi xmlns:a14="http://schemas.microsoft.com/office/drawing/2010/main" val="0"/>
+                <a14:useLocalDpi xmlns:a14="http://schemas.microsoft.com/office/drawing/2010/main"/>
               </a:ext>
             </a:extLst>
           </a:blip>
-          <a:srcRect t="18934" b="6891"/>
+          <a:srcRect/>
           <a:stretch/>
         </p:blipFill>
         <p:spPr>
@@ -3560,14 +4175,14 @@
           <a:lstStyle/>
           <a:p>
             <a:r>
-              <a:rPr lang="en-US" dirty="0" smtClean="0">
+              <a:rPr lang="en-US" b="1" dirty="0" smtClean="0">
                 <a:solidFill>
                   <a:srgbClr val="0070C0"/>
                 </a:solidFill>
               </a:rPr>
               <a:t>Robot Game</a:t>
             </a:r>
-            <a:endParaRPr lang="en-US" dirty="0">
+            <a:endParaRPr lang="en-US" b="1" dirty="0">
               <a:solidFill>
                 <a:srgbClr val="0070C0"/>
               </a:solidFill>
@@ -3587,18 +4202,22 @@
         </p:nvSpPr>
         <p:spPr>
           <a:xfrm>
-            <a:off x="5417708" y="1597548"/>
-            <a:ext cx="3381518" cy="4351338"/>
+            <a:off x="5417708" y="1395666"/>
+            <a:ext cx="3381518" cy="5028105"/>
           </a:xfrm>
         </p:spPr>
         <p:txBody>
           <a:bodyPr>
-            <a:normAutofit lnSpcReduction="10000"/>
+            <a:normAutofit/>
           </a:bodyPr>
           <a:lstStyle/>
           <a:p>
             <a:r>
-              <a:rPr lang="en-US" sz="2400" dirty="0" smtClean="0"/>
+              <a:rPr lang="en-US" sz="2000" dirty="0" smtClean="0">
+                <a:solidFill>
+                  <a:srgbClr val="FF0000"/>
+                </a:solidFill>
+              </a:rPr>
               <a:t>Goal: </a:t>
             </a:r>
           </a:p>
@@ -3606,7 +4225,7 @@
             <a:pPr lvl="1"/>
             <a:r>
               <a:rPr lang="en-US" sz="2000" dirty="0" smtClean="0"/>
-              <a:t>Complete LEGO-based missions in 2.5minutes</a:t>
+              <a:t>Complete LEGO-based missions in 2.5 mins</a:t>
             </a:r>
           </a:p>
           <a:p>
@@ -3618,18 +4237,22 @@
           </a:p>
           <a:p>
             <a:r>
-              <a:rPr lang="en-US" sz="2400" dirty="0" smtClean="0"/>
-              <a:t>Teams are judged on the quality of their design and programming</a:t>
-            </a:r>
-          </a:p>
-          <a:p>
-            <a:r>
-              <a:rPr lang="en-US" sz="2400" dirty="0" smtClean="0"/>
-              <a:t>Teams participate in timed matches</a:t>
-            </a:r>
-          </a:p>
-          <a:p>
-            <a:endParaRPr lang="en-US" sz="2400" dirty="0"/>
+              <a:rPr lang="en-US" sz="2000" dirty="0"/>
+              <a:t>Teams participate in timed </a:t>
+            </a:r>
+            <a:r>
+              <a:rPr lang="en-US" sz="2000" dirty="0" smtClean="0"/>
+              <a:t>matches</a:t>
+            </a:r>
+          </a:p>
+          <a:p>
+            <a:r>
+              <a:rPr lang="en-US" sz="2000" dirty="0" smtClean="0"/>
+              <a:t>Teams are judged on the quality of their design, strategy, innovation &amp; programming</a:t>
+            </a:r>
+          </a:p>
+          <a:p>
+            <a:endParaRPr lang="en-US" sz="2000" dirty="0"/>
           </a:p>
         </p:txBody>
       </p:sp>
@@ -3681,14 +4304,14 @@
           <p:nvPr/>
         </p:nvPicPr>
         <p:blipFill rotWithShape="1">
-          <a:blip r:embed="rId3" cstate="screen">
+          <a:blip r:embed="rId3" cstate="print">
             <a:extLst>
               <a:ext uri="{28A0092B-C50C-407E-A947-70E740481C1C}">
-                <a14:useLocalDpi xmlns:a14="http://schemas.microsoft.com/office/drawing/2010/main" val="0"/>
+                <a14:useLocalDpi xmlns:a14="http://schemas.microsoft.com/office/drawing/2010/main"/>
               </a:ext>
             </a:extLst>
           </a:blip>
-          <a:srcRect l="20164" t="25356" r="-819" b="14430"/>
+          <a:srcRect r="-1026"/>
           <a:stretch/>
         </p:blipFill>
         <p:spPr>
@@ -3701,6 +4324,29 @@
           </a:prstGeom>
         </p:spPr>
       </p:pic>
+      <p:sp>
+        <p:nvSpPr>
+          <p:cNvPr id="6" name="Slide Number Placeholder 5"/>
+          <p:cNvSpPr>
+            <a:spLocks noGrp="1"/>
+          </p:cNvSpPr>
+          <p:nvPr>
+            <p:ph type="sldNum" sz="quarter" idx="12"/>
+          </p:nvPr>
+        </p:nvSpPr>
+        <p:spPr/>
+        <p:txBody>
+          <a:bodyPr/>
+          <a:lstStyle/>
+          <a:p>
+            <a:fld id="{8AE9E5C2-A58E-4F36-B7BD-0EB00048A08B}" type="slidenum">
+              <a:rPr lang="en-US" smtClean="0"/>
+              <a:t>4</a:t>
+            </a:fld>
+            <a:endParaRPr lang="en-US"/>
+          </a:p>
+        </p:txBody>
+      </p:sp>
     </p:spTree>
     <p:extLst>
       <p:ext uri="{BB962C8B-B14F-4D97-AF65-F5344CB8AC3E}">
@@ -3747,14 +4393,14 @@
           <a:lstStyle/>
           <a:p>
             <a:r>
-              <a:rPr lang="en-US" dirty="0" smtClean="0">
+              <a:rPr lang="en-US" b="1" dirty="0" smtClean="0">
                 <a:solidFill>
                   <a:srgbClr val="0070C0"/>
                 </a:solidFill>
               </a:rPr>
               <a:t>Research Project</a:t>
             </a:r>
-            <a:endParaRPr lang="en-US" dirty="0">
+            <a:endParaRPr lang="en-US" b="1" dirty="0">
               <a:solidFill>
                 <a:srgbClr val="0070C0"/>
               </a:solidFill>
@@ -3774,54 +4420,58 @@
         </p:nvSpPr>
         <p:spPr>
           <a:xfrm>
-            <a:off x="628650" y="1825624"/>
+            <a:off x="628650" y="1631186"/>
             <a:ext cx="3898380" cy="4530205"/>
           </a:xfrm>
         </p:spPr>
         <p:txBody>
           <a:bodyPr>
-            <a:normAutofit fontScale="92500" lnSpcReduction="20000"/>
+            <a:noAutofit/>
           </a:bodyPr>
           <a:lstStyle/>
           <a:p>
             <a:r>
-              <a:rPr lang="en-US" dirty="0" smtClean="0"/>
+              <a:rPr lang="en-US" sz="2000" dirty="0" smtClean="0">
+                <a:solidFill>
+                  <a:srgbClr val="FF0000"/>
+                </a:solidFill>
+              </a:rPr>
               <a:t>Goal: </a:t>
             </a:r>
           </a:p>
           <a:p>
             <a:pPr lvl="1"/>
             <a:r>
-              <a:rPr lang="en-US" dirty="0" smtClean="0"/>
+              <a:rPr lang="en-US" sz="2000" dirty="0" smtClean="0"/>
               <a:t>Identify a problem</a:t>
             </a:r>
           </a:p>
           <a:p>
             <a:pPr lvl="1"/>
             <a:r>
-              <a:rPr lang="en-US" dirty="0" smtClean="0"/>
+              <a:rPr lang="en-US" sz="2000" dirty="0" smtClean="0"/>
               <a:t>Come up with an innovative solution</a:t>
             </a:r>
           </a:p>
           <a:p>
             <a:pPr lvl="1"/>
             <a:r>
-              <a:rPr lang="en-US" dirty="0" smtClean="0"/>
+              <a:rPr lang="en-US" sz="2000" dirty="0" smtClean="0"/>
               <a:t>Share the solution with others</a:t>
             </a:r>
           </a:p>
           <a:p>
             <a:r>
-              <a:rPr lang="en-US" dirty="0" smtClean="0"/>
+              <a:rPr lang="en-US" sz="2000" dirty="0" smtClean="0"/>
               <a:t>The topic is always related to the year’s theme</a:t>
             </a:r>
           </a:p>
           <a:p>
             <a:r>
-              <a:rPr lang="en-US" dirty="0" smtClean="0"/>
+              <a:rPr lang="en-US" sz="2000" dirty="0" smtClean="0"/>
               <a:t>Teams are judged based on the quality of their research and solution, but also the creativity of their presentation to judges</a:t>
             </a:r>
-            <a:endParaRPr lang="en-US" dirty="0"/>
+            <a:endParaRPr lang="en-US" sz="2000" dirty="0"/>
           </a:p>
         </p:txBody>
       </p:sp>
@@ -3837,7 +4487,7 @@
           <a:blip r:embed="rId2" cstate="screen">
             <a:extLst>
               <a:ext uri="{28A0092B-C50C-407E-A947-70E740481C1C}">
-                <a14:useLocalDpi xmlns:a14="http://schemas.microsoft.com/office/drawing/2010/main" val="0"/>
+                <a14:useLocalDpi xmlns:a14="http://schemas.microsoft.com/office/drawing/2010/main"/>
               </a:ext>
             </a:extLst>
           </a:blip>
@@ -3855,6 +4505,29 @@
           </a:prstGeom>
         </p:spPr>
       </p:pic>
+      <p:sp>
+        <p:nvSpPr>
+          <p:cNvPr id="4" name="Slide Number Placeholder 3"/>
+          <p:cNvSpPr>
+            <a:spLocks noGrp="1"/>
+          </p:cNvSpPr>
+          <p:nvPr>
+            <p:ph type="sldNum" sz="quarter" idx="12"/>
+          </p:nvPr>
+        </p:nvSpPr>
+        <p:spPr/>
+        <p:txBody>
+          <a:bodyPr/>
+          <a:lstStyle/>
+          <a:p>
+            <a:fld id="{8AE9E5C2-A58E-4F36-B7BD-0EB00048A08B}" type="slidenum">
+              <a:rPr lang="en-US" smtClean="0"/>
+              <a:t>5</a:t>
+            </a:fld>
+            <a:endParaRPr lang="en-US"/>
+          </a:p>
+        </p:txBody>
+      </p:sp>
     </p:spTree>
     <p:extLst>
       <p:ext uri="{BB962C8B-B14F-4D97-AF65-F5344CB8AC3E}">
@@ -3901,14 +4574,14 @@
           <a:lstStyle/>
           <a:p>
             <a:r>
-              <a:rPr lang="en-US" dirty="0" smtClean="0">
+              <a:rPr lang="en-US" b="1" dirty="0" smtClean="0">
                 <a:solidFill>
                   <a:srgbClr val="0070C0"/>
                 </a:solidFill>
               </a:rPr>
               <a:t>Core Values</a:t>
             </a:r>
-            <a:endParaRPr lang="en-US" dirty="0">
+            <a:endParaRPr lang="en-US" b="1" dirty="0">
               <a:solidFill>
                 <a:srgbClr val="0070C0"/>
               </a:solidFill>
@@ -3928,83 +4601,122 @@
         </p:nvSpPr>
         <p:spPr>
           <a:xfrm>
-            <a:off x="628650" y="1825625"/>
+            <a:off x="628650" y="1386238"/>
             <a:ext cx="4438025" cy="4351338"/>
           </a:xfrm>
         </p:spPr>
         <p:txBody>
           <a:bodyPr>
-            <a:normAutofit fontScale="85000" lnSpcReduction="20000"/>
+            <a:noAutofit/>
           </a:bodyPr>
           <a:lstStyle/>
           <a:p>
             <a:r>
-              <a:rPr lang="en-US" dirty="0" smtClean="0"/>
+              <a:rPr lang="en-US" sz="2000" dirty="0" smtClean="0">
+                <a:solidFill>
+                  <a:srgbClr val="FF0000"/>
+                </a:solidFill>
+              </a:rPr>
               <a:t>Goal: </a:t>
             </a:r>
           </a:p>
           <a:p>
             <a:pPr lvl="1"/>
             <a:r>
-              <a:rPr lang="en-US" dirty="0" smtClean="0"/>
-              <a:t>Helping and working with other teams (Gracious Professionalism and </a:t>
-            </a:r>
-            <a:r>
-              <a:rPr lang="en-US" dirty="0" err="1" smtClean="0"/>
+              <a:rPr lang="en-US" sz="2000" dirty="0" smtClean="0"/>
+              <a:t>Helping and working with each other and other teams (Gracious Professionalism and </a:t>
+            </a:r>
+            <a:r>
+              <a:rPr lang="en-US" sz="2000" dirty="0" err="1" smtClean="0"/>
               <a:t>Coopertition</a:t>
             </a:r>
             <a:r>
-              <a:rPr lang="en-US" dirty="0" smtClean="0"/>
+              <a:rPr lang="en-US" sz="2000" dirty="0" smtClean="0"/>
               <a:t>)</a:t>
             </a:r>
           </a:p>
           <a:p>
             <a:pPr lvl="1"/>
             <a:r>
-              <a:rPr lang="en-US" dirty="0"/>
+              <a:rPr lang="en-US" sz="2000" dirty="0"/>
               <a:t>S</a:t>
             </a:r>
             <a:r>
-              <a:rPr lang="en-US" dirty="0" smtClean="0"/>
+              <a:rPr lang="en-US" sz="2000" dirty="0" smtClean="0"/>
               <a:t>preading STEM</a:t>
             </a:r>
           </a:p>
           <a:p>
             <a:pPr lvl="1"/>
             <a:r>
-              <a:rPr lang="en-US" dirty="0"/>
+              <a:rPr lang="en-US" sz="2000" dirty="0"/>
               <a:t>I</a:t>
             </a:r>
             <a:r>
-              <a:rPr lang="en-US" dirty="0" smtClean="0"/>
+              <a:rPr lang="en-US" sz="2000" dirty="0" smtClean="0"/>
               <a:t>nspiring others</a:t>
             </a:r>
           </a:p>
           <a:p>
             <a:r>
-              <a:rPr lang="en-US" dirty="0" smtClean="0"/>
-              <a:t>Many teams mentor other teams and do outreach events such as running camps or doing demos in public places</a:t>
-            </a:r>
-          </a:p>
-          <a:p>
-            <a:r>
-              <a:rPr lang="en-US" dirty="0" smtClean="0"/>
-              <a:t>Teams are judged based on how students work together,  and their </a:t>
-            </a:r>
-            <a:r>
-              <a:rPr lang="en-US" dirty="0" smtClean="0"/>
-              <a:t>understanding </a:t>
-            </a:r>
-            <a:r>
-              <a:rPr lang="en-US" dirty="0" smtClean="0"/>
-              <a:t>and application of the 8 FLL Core Values</a:t>
-            </a:r>
+              <a:rPr lang="en-US" sz="2000" dirty="0" smtClean="0"/>
+              <a:t>Many teams do outreach events such as running a demo at a library</a:t>
+            </a:r>
+          </a:p>
+          <a:p>
+            <a:r>
+              <a:rPr lang="en-US" sz="2000" dirty="0" smtClean="0"/>
+              <a:t>Teams develop their own identity with team shirts, hats and even team haircuts!</a:t>
+            </a:r>
+          </a:p>
+          <a:p>
+            <a:r>
+              <a:rPr lang="en-US" sz="2000" dirty="0" smtClean="0"/>
+              <a:t>Teams are judged based on how students work together,  and their understanding and application of the </a:t>
+            </a:r>
+            <a:r>
+              <a:rPr lang="en-US" sz="2000" dirty="0" smtClean="0">
+                <a:solidFill>
+                  <a:srgbClr val="FF0000"/>
+                </a:solidFill>
+              </a:rPr>
+              <a:t>8 Core </a:t>
+            </a:r>
+            <a:r>
+              <a:rPr lang="en-US" sz="2000" dirty="0">
+                <a:solidFill>
+                  <a:srgbClr val="FF0000"/>
+                </a:solidFill>
+              </a:rPr>
+              <a:t>Values </a:t>
+            </a:r>
+            <a:r>
+              <a:rPr lang="en-US" sz="2000" dirty="0"/>
+              <a:t>(https://</a:t>
+            </a:r>
+            <a:r>
+              <a:rPr lang="en-US" sz="2000" dirty="0" err="1" smtClean="0"/>
+              <a:t>www.firstinspires.org</a:t>
+            </a:r>
+            <a:r>
+              <a:rPr lang="en-US" sz="2000" dirty="0" smtClean="0"/>
+              <a:t>/robotics/</a:t>
+            </a:r>
+            <a:r>
+              <a:rPr lang="en-US" sz="2000" dirty="0" err="1" smtClean="0"/>
+              <a:t>fll</a:t>
+            </a:r>
+            <a:r>
+              <a:rPr lang="en-US" sz="2000" dirty="0" smtClean="0"/>
+              <a:t>/core-values)</a:t>
+            </a:r>
+            <a:endParaRPr lang="en-US" sz="2000" dirty="0" smtClean="0"/>
           </a:p>
         </p:txBody>
       </p:sp>
       <p:pic>
         <p:nvPicPr>
-          <p:cNvPr id="5" name="Picture 4"/>
+          <p:cNvPr id="6" name="Picture 5"/>
           <p:cNvPicPr>
             <a:picLocks noChangeAspect="1"/>
           </p:cNvPicPr>
@@ -4014,37 +4726,7 @@
           <a:blip r:embed="rId2" cstate="screen">
             <a:extLst>
               <a:ext uri="{28A0092B-C50C-407E-A947-70E740481C1C}">
-                <a14:useLocalDpi xmlns:a14="http://schemas.microsoft.com/office/drawing/2010/main" val="0"/>
-              </a:ext>
-            </a:extLst>
-          </a:blip>
-          <a:stretch>
-            <a:fillRect/>
-          </a:stretch>
-        </p:blipFill>
-        <p:spPr>
-          <a:xfrm>
-            <a:off x="5256393" y="4260597"/>
-            <a:ext cx="3527842" cy="2342707"/>
-          </a:xfrm>
-          <a:prstGeom prst="rect">
-            <a:avLst/>
-          </a:prstGeom>
-        </p:spPr>
-      </p:pic>
-      <p:pic>
-        <p:nvPicPr>
-          <p:cNvPr id="6" name="Picture 5"/>
-          <p:cNvPicPr>
-            <a:picLocks noChangeAspect="1"/>
-          </p:cNvPicPr>
-          <p:nvPr/>
-        </p:nvPicPr>
-        <p:blipFill>
-          <a:blip r:embed="rId3" cstate="screen">
-            <a:extLst>
-              <a:ext uri="{28A0092B-C50C-407E-A947-70E740481C1C}">
-                <a14:useLocalDpi xmlns:a14="http://schemas.microsoft.com/office/drawing/2010/main" val="0"/>
+                <a14:useLocalDpi xmlns:a14="http://schemas.microsoft.com/office/drawing/2010/main"/>
               </a:ext>
             </a:extLst>
           </a:blip>
@@ -4062,6 +4744,59 @@
           </a:prstGeom>
         </p:spPr>
       </p:pic>
+      <p:pic>
+        <p:nvPicPr>
+          <p:cNvPr id="7" name="Picture 6"/>
+          <p:cNvPicPr>
+            <a:picLocks noChangeAspect="1"/>
+          </p:cNvPicPr>
+          <p:nvPr/>
+        </p:nvPicPr>
+        <p:blipFill>
+          <a:blip r:embed="rId3" cstate="screen">
+            <a:extLst>
+              <a:ext uri="{28A0092B-C50C-407E-A947-70E740481C1C}">
+                <a14:useLocalDpi xmlns:a14="http://schemas.microsoft.com/office/drawing/2010/main"/>
+              </a:ext>
+            </a:extLst>
+          </a:blip>
+          <a:stretch>
+            <a:fillRect/>
+          </a:stretch>
+        </p:blipFill>
+        <p:spPr>
+          <a:xfrm>
+            <a:off x="5301360" y="4144487"/>
+            <a:ext cx="3482875" cy="2315741"/>
+          </a:xfrm>
+          <a:prstGeom prst="rect">
+            <a:avLst/>
+          </a:prstGeom>
+        </p:spPr>
+      </p:pic>
+      <p:sp>
+        <p:nvSpPr>
+          <p:cNvPr id="4" name="Slide Number Placeholder 3"/>
+          <p:cNvSpPr>
+            <a:spLocks noGrp="1"/>
+          </p:cNvSpPr>
+          <p:nvPr>
+            <p:ph type="sldNum" sz="quarter" idx="12"/>
+          </p:nvPr>
+        </p:nvSpPr>
+        <p:spPr/>
+        <p:txBody>
+          <a:bodyPr/>
+          <a:lstStyle/>
+          <a:p>
+            <a:fld id="{8AE9E5C2-A58E-4F36-B7BD-0EB00048A08B}" type="slidenum">
+              <a:rPr lang="en-US" smtClean="0"/>
+              <a:t>6</a:t>
+            </a:fld>
+            <a:endParaRPr lang="en-US"/>
+          </a:p>
+        </p:txBody>
+      </p:sp>
     </p:spTree>
     <p:extLst>
       <p:ext uri="{BB962C8B-B14F-4D97-AF65-F5344CB8AC3E}">
@@ -4108,18 +4843,378 @@
           <a:lstStyle/>
           <a:p>
             <a:r>
-              <a:rPr lang="en-US" dirty="0" smtClean="0">
+              <a:rPr lang="en-US" b="1" dirty="0" smtClean="0">
                 <a:solidFill>
                   <a:srgbClr val="0070C0"/>
                 </a:solidFill>
               </a:rPr>
-              <a:t>FLL is HARD FUN!</a:t>
-            </a:r>
-            <a:endParaRPr lang="en-US" dirty="0">
+              <a:t>FIRST LEGO League is HARD FUN!</a:t>
+            </a:r>
+            <a:endParaRPr lang="en-US" b="1" dirty="0">
               <a:solidFill>
                 <a:srgbClr val="0070C0"/>
               </a:solidFill>
             </a:endParaRPr>
+          </a:p>
+        </p:txBody>
+      </p:sp>
+      <p:pic>
+        <p:nvPicPr>
+          <p:cNvPr id="6" name="Picture 5"/>
+          <p:cNvPicPr>
+            <a:picLocks noChangeAspect="1"/>
+          </p:cNvPicPr>
+          <p:nvPr/>
+        </p:nvPicPr>
+        <p:blipFill>
+          <a:blip r:embed="rId2" cstate="screen">
+            <a:extLst>
+              <a:ext uri="{28A0092B-C50C-407E-A947-70E740481C1C}">
+                <a14:useLocalDpi xmlns:a14="http://schemas.microsoft.com/office/drawing/2010/main"/>
+              </a:ext>
+            </a:extLst>
+          </a:blip>
+          <a:stretch>
+            <a:fillRect/>
+          </a:stretch>
+        </p:blipFill>
+        <p:spPr>
+          <a:xfrm>
+            <a:off x="259750" y="4085131"/>
+            <a:ext cx="3779191" cy="2512760"/>
+          </a:xfrm>
+          <a:prstGeom prst="rect">
+            <a:avLst/>
+          </a:prstGeom>
+        </p:spPr>
+      </p:pic>
+      <p:sp>
+        <p:nvSpPr>
+          <p:cNvPr id="7" name="TextBox 6"/>
+          <p:cNvSpPr txBox="1"/>
+          <p:nvPr/>
+        </p:nvSpPr>
+        <p:spPr>
+          <a:xfrm>
+            <a:off x="4254306" y="1407475"/>
+            <a:ext cx="4735315" cy="3539430"/>
+          </a:xfrm>
+          <a:prstGeom prst="rect">
+            <a:avLst/>
+          </a:prstGeom>
+          <a:noFill/>
+        </p:spPr>
+        <p:txBody>
+          <a:bodyPr wrap="square" rtlCol="0">
+            <a:spAutoFit/>
+          </a:bodyPr>
+          <a:lstStyle/>
+          <a:p>
+            <a:pPr marL="457200" indent="-457200">
+              <a:buFont typeface="Arial" charset="0"/>
+              <a:buChar char="•"/>
+            </a:pPr>
+            <a:r>
+              <a:rPr lang="en-US" sz="2800" dirty="0" smtClean="0"/>
+              <a:t>Learn </a:t>
+            </a:r>
+            <a:r>
+              <a:rPr lang="en-US" sz="2800" dirty="0" smtClean="0">
+                <a:solidFill>
+                  <a:srgbClr val="FF0000"/>
+                </a:solidFill>
+              </a:rPr>
+              <a:t>STEM skills</a:t>
+            </a:r>
+            <a:r>
+              <a:rPr lang="en-US" sz="2800" dirty="0" smtClean="0"/>
+              <a:t> (Math, Science, Research…)</a:t>
+            </a:r>
+          </a:p>
+          <a:p>
+            <a:pPr marL="457200" indent="-457200">
+              <a:buFont typeface="Arial" charset="0"/>
+              <a:buChar char="•"/>
+            </a:pPr>
+            <a:r>
+              <a:rPr lang="en-US" sz="2800" dirty="0" smtClean="0"/>
+              <a:t>Learn</a:t>
+            </a:r>
+            <a:r>
+              <a:rPr lang="en-US" sz="2800" dirty="0" smtClean="0">
+                <a:solidFill>
+                  <a:srgbClr val="FF0000"/>
+                </a:solidFill>
+              </a:rPr>
+              <a:t> life skills</a:t>
+            </a:r>
+            <a:r>
+              <a:rPr lang="en-US" sz="2800" dirty="0"/>
+              <a:t> </a:t>
+            </a:r>
+            <a:r>
+              <a:rPr lang="en-US" sz="2800" dirty="0" smtClean="0"/>
+              <a:t>(teamwork, presentation, interviewing, confidence…)</a:t>
+            </a:r>
+          </a:p>
+          <a:p>
+            <a:pPr marL="457200" indent="-457200">
+              <a:buFont typeface="Arial" charset="0"/>
+              <a:buChar char="•"/>
+            </a:pPr>
+            <a:r>
+              <a:rPr lang="en-US" sz="2800" dirty="0" smtClean="0"/>
+              <a:t>Make </a:t>
+            </a:r>
+            <a:r>
+              <a:rPr lang="en-US" sz="2800" dirty="0" smtClean="0">
+                <a:solidFill>
+                  <a:srgbClr val="FF0000"/>
+                </a:solidFill>
+              </a:rPr>
+              <a:t>friends</a:t>
+            </a:r>
+            <a:r>
+              <a:rPr lang="en-US" sz="2800" dirty="0" smtClean="0"/>
+              <a:t> from around the world</a:t>
+            </a:r>
+          </a:p>
+          <a:p>
+            <a:pPr marL="457200" indent="-457200">
+              <a:buFont typeface="Arial" charset="0"/>
+              <a:buChar char="•"/>
+            </a:pPr>
+            <a:r>
+              <a:rPr lang="en-US" sz="2800" dirty="0" smtClean="0"/>
+              <a:t>Have fun!</a:t>
+            </a:r>
+            <a:endParaRPr lang="en-US" sz="2800" dirty="0"/>
+          </a:p>
+        </p:txBody>
+      </p:sp>
+      <p:pic>
+        <p:nvPicPr>
+          <p:cNvPr id="3" name="Picture 2"/>
+          <p:cNvPicPr>
+            <a:picLocks noChangeAspect="1"/>
+          </p:cNvPicPr>
+          <p:nvPr/>
+        </p:nvPicPr>
+        <p:blipFill rotWithShape="1">
+          <a:blip r:embed="rId3" cstate="print">
+            <a:extLst>
+              <a:ext uri="{28A0092B-C50C-407E-A947-70E740481C1C}">
+                <a14:useLocalDpi xmlns:a14="http://schemas.microsoft.com/office/drawing/2010/main"/>
+              </a:ext>
+            </a:extLst>
+          </a:blip>
+          <a:srcRect r="24296" b="24650"/>
+          <a:stretch/>
+        </p:blipFill>
+        <p:spPr>
+          <a:xfrm>
+            <a:off x="259750" y="1407475"/>
+            <a:ext cx="3779191" cy="2499504"/>
+          </a:xfrm>
+          <a:prstGeom prst="rect">
+            <a:avLst/>
+          </a:prstGeom>
+        </p:spPr>
+      </p:pic>
+      <p:sp>
+        <p:nvSpPr>
+          <p:cNvPr id="8" name="Slide Number Placeholder 7"/>
+          <p:cNvSpPr>
+            <a:spLocks noGrp="1"/>
+          </p:cNvSpPr>
+          <p:nvPr>
+            <p:ph type="sldNum" sz="quarter" idx="12"/>
+          </p:nvPr>
+        </p:nvSpPr>
+        <p:spPr/>
+        <p:txBody>
+          <a:bodyPr/>
+          <a:lstStyle/>
+          <a:p>
+            <a:fld id="{8AE9E5C2-A58E-4F36-B7BD-0EB00048A08B}" type="slidenum">
+              <a:rPr lang="en-US" smtClean="0"/>
+              <a:t>7</a:t>
+            </a:fld>
+            <a:endParaRPr lang="en-US"/>
+          </a:p>
+        </p:txBody>
+      </p:sp>
+    </p:spTree>
+    <p:extLst>
+      <p:ext uri="{BB962C8B-B14F-4D97-AF65-F5344CB8AC3E}">
+        <p14:creationId xmlns:p14="http://schemas.microsoft.com/office/powerpoint/2010/main" val="3553371775"/>
+      </p:ext>
+    </p:extLst>
+  </p:cSld>
+  <p:clrMapOvr>
+    <a:masterClrMapping/>
+  </p:clrMapOvr>
+</p:sld>
+</file>
+
+<file path=ppt/slides/slide8.xml><?xml version="1.0" encoding="utf-8"?>
+<p:sld xmlns:a="http://schemas.openxmlformats.org/drawingml/2006/main" xmlns:r="http://schemas.openxmlformats.org/officeDocument/2006/relationships" xmlns:p="http://schemas.openxmlformats.org/presentationml/2006/main">
+  <p:cSld>
+    <p:spTree>
+      <p:nvGrpSpPr>
+        <p:cNvPr id="1" name=""/>
+        <p:cNvGrpSpPr/>
+        <p:nvPr/>
+      </p:nvGrpSpPr>
+      <p:grpSpPr>
+        <a:xfrm>
+          <a:off x="0" y="0"/>
+          <a:ext cx="0" cy="0"/>
+          <a:chOff x="0" y="0"/>
+          <a:chExt cx="0" cy="0"/>
+        </a:xfrm>
+      </p:grpSpPr>
+      <p:sp>
+        <p:nvSpPr>
+          <p:cNvPr id="2" name="Title 1"/>
+          <p:cNvSpPr>
+            <a:spLocks noGrp="1"/>
+          </p:cNvSpPr>
+          <p:nvPr>
+            <p:ph type="title"/>
+          </p:nvPr>
+        </p:nvSpPr>
+        <p:spPr/>
+        <p:txBody>
+          <a:bodyPr>
+            <a:normAutofit/>
+          </a:bodyPr>
+          <a:lstStyle/>
+          <a:p>
+            <a:r>
+              <a:rPr lang="en-US" b="1" dirty="0" smtClean="0">
+                <a:solidFill>
+                  <a:srgbClr val="0070C0"/>
+                </a:solidFill>
+              </a:rPr>
+              <a:t>Useful Resources</a:t>
+            </a:r>
+            <a:endParaRPr lang="en-US" b="1" dirty="0">
+              <a:solidFill>
+                <a:srgbClr val="0070C0"/>
+              </a:solidFill>
+            </a:endParaRPr>
+          </a:p>
+        </p:txBody>
+      </p:sp>
+      <p:sp>
+        <p:nvSpPr>
+          <p:cNvPr id="3" name="Content Placeholder 2"/>
+          <p:cNvSpPr>
+            <a:spLocks noGrp="1"/>
+          </p:cNvSpPr>
+          <p:nvPr>
+            <p:ph idx="1"/>
+          </p:nvPr>
+        </p:nvSpPr>
+        <p:spPr/>
+        <p:txBody>
+          <a:bodyPr/>
+          <a:lstStyle/>
+          <a:p>
+            <a:r>
+              <a:rPr lang="en-US" dirty="0" smtClean="0">
+                <a:solidFill>
+                  <a:srgbClr val="FF0000"/>
+                </a:solidFill>
+              </a:rPr>
+              <a:t>Coaching Resources:</a:t>
+            </a:r>
+          </a:p>
+          <a:p>
+            <a:pPr lvl="1"/>
+            <a:r>
+              <a:rPr lang="en-US" dirty="0"/>
+              <a:t>FIRST Steps: http://</a:t>
+            </a:r>
+            <a:r>
+              <a:rPr lang="en-US" dirty="0" err="1"/>
+              <a:t>info.firstinspires.org</a:t>
+            </a:r>
+            <a:r>
+              <a:rPr lang="en-US" dirty="0"/>
+              <a:t>/</a:t>
+            </a:r>
+            <a:r>
+              <a:rPr lang="en-US" dirty="0" err="1"/>
+              <a:t>fllfirststepsrequest</a:t>
+            </a:r>
+            <a:endParaRPr lang="en-US" dirty="0" smtClean="0"/>
+          </a:p>
+          <a:p>
+            <a:r>
+              <a:rPr lang="en-US" dirty="0" smtClean="0">
+                <a:solidFill>
+                  <a:srgbClr val="FF0000"/>
+                </a:solidFill>
+              </a:rPr>
+              <a:t>Programming Lessons/Starter Robot Designs:</a:t>
+            </a:r>
+          </a:p>
+          <a:p>
+            <a:pPr lvl="1"/>
+            <a:r>
+              <a:rPr lang="en-US" dirty="0" smtClean="0"/>
+              <a:t>www.EV3Lessons.com</a:t>
+            </a:r>
+          </a:p>
+          <a:p>
+            <a:r>
+              <a:rPr lang="en-US" dirty="0" smtClean="0">
+                <a:solidFill>
+                  <a:srgbClr val="FF0000"/>
+                </a:solidFill>
+              </a:rPr>
+              <a:t>Challenge Documents:</a:t>
+            </a:r>
+          </a:p>
+          <a:p>
+            <a:pPr lvl="1"/>
+            <a:r>
+              <a:rPr lang="en-US" dirty="0"/>
+              <a:t>http://</a:t>
+            </a:r>
+            <a:r>
+              <a:rPr lang="en-US" dirty="0" smtClean="0"/>
+              <a:t>www.firstlegoleague.org/challenge</a:t>
+            </a:r>
+            <a:endParaRPr lang="en-US" dirty="0"/>
+          </a:p>
+          <a:p>
+            <a:r>
+              <a:rPr lang="en-US" dirty="0" smtClean="0">
+                <a:solidFill>
+                  <a:srgbClr val="FF0000"/>
+                </a:solidFill>
+              </a:rPr>
+              <a:t>Organizers in each country:</a:t>
+            </a:r>
+          </a:p>
+          <a:p>
+            <a:pPr lvl="1"/>
+            <a:r>
+              <a:rPr lang="en-US" dirty="0"/>
+              <a:t>http://</a:t>
+            </a:r>
+            <a:r>
+              <a:rPr lang="en-US" dirty="0" err="1"/>
+              <a:t>www.firstlegoleague.org</a:t>
+            </a:r>
+            <a:r>
+              <a:rPr lang="en-US" dirty="0"/>
+              <a:t>/countries</a:t>
+            </a:r>
+            <a:endParaRPr lang="en-US" dirty="0" smtClean="0"/>
           </a:p>
         </p:txBody>
       </p:sp>
@@ -4132,10 +5227,10 @@
           <p:nvPr/>
         </p:nvPicPr>
         <p:blipFill>
-          <a:blip r:embed="rId2" cstate="screen">
+          <a:blip r:embed="rId2" cstate="print">
             <a:extLst>
               <a:ext uri="{28A0092B-C50C-407E-A947-70E740481C1C}">
-                <a14:useLocalDpi xmlns:a14="http://schemas.microsoft.com/office/drawing/2010/main" val="0"/>
+                <a14:useLocalDpi xmlns:a14="http://schemas.microsoft.com/office/drawing/2010/main"/>
               </a:ext>
             </a:extLst>
           </a:blip>
@@ -4145,144 +5240,151 @@
         </p:blipFill>
         <p:spPr>
           <a:xfrm>
-            <a:off x="253993" y="4186402"/>
-            <a:ext cx="3703411" cy="2462374"/>
+            <a:off x="7564582" y="320674"/>
+            <a:ext cx="1286680" cy="1528729"/>
           </a:xfrm>
           <a:prstGeom prst="rect">
             <a:avLst/>
           </a:prstGeom>
         </p:spPr>
       </p:pic>
-      <p:pic>
-        <p:nvPicPr>
-          <p:cNvPr id="5" name="Picture 4"/>
-          <p:cNvPicPr>
-            <a:picLocks noChangeAspect="1"/>
-          </p:cNvPicPr>
-          <p:nvPr/>
-        </p:nvPicPr>
-        <p:blipFill>
-          <a:blip r:embed="rId3" cstate="screen">
-            <a:extLst>
-              <a:ext uri="{28A0092B-C50C-407E-A947-70E740481C1C}">
-                <a14:useLocalDpi xmlns:a14="http://schemas.microsoft.com/office/drawing/2010/main" val="0"/>
-              </a:ext>
-            </a:extLst>
-          </a:blip>
-          <a:stretch>
-            <a:fillRect/>
-          </a:stretch>
-        </p:blipFill>
-        <p:spPr>
-          <a:xfrm>
-            <a:off x="259750" y="1407475"/>
-            <a:ext cx="3697654" cy="2458546"/>
-          </a:xfrm>
-          <a:prstGeom prst="rect">
-            <a:avLst/>
-          </a:prstGeom>
-        </p:spPr>
-      </p:pic>
-      <p:pic>
-        <p:nvPicPr>
-          <p:cNvPr id="6" name="Picture 5"/>
-          <p:cNvPicPr>
-            <a:picLocks noChangeAspect="1"/>
-          </p:cNvPicPr>
-          <p:nvPr/>
-        </p:nvPicPr>
-        <p:blipFill>
-          <a:blip r:embed="rId4" cstate="screen">
-            <a:extLst>
-              <a:ext uri="{28A0092B-C50C-407E-A947-70E740481C1C}">
-                <a14:useLocalDpi xmlns:a14="http://schemas.microsoft.com/office/drawing/2010/main" val="0"/>
-              </a:ext>
-            </a:extLst>
-          </a:blip>
-          <a:stretch>
-            <a:fillRect/>
-          </a:stretch>
-        </p:blipFill>
-        <p:spPr>
-          <a:xfrm>
-            <a:off x="4585787" y="4186402"/>
-            <a:ext cx="3779191" cy="2512760"/>
-          </a:xfrm>
-          <a:prstGeom prst="rect">
-            <a:avLst/>
-          </a:prstGeom>
-        </p:spPr>
-      </p:pic>
-      <p:sp>
-        <p:nvSpPr>
-          <p:cNvPr id="7" name="TextBox 6"/>
-          <p:cNvSpPr txBox="1"/>
-          <p:nvPr/>
-        </p:nvSpPr>
-        <p:spPr>
-          <a:xfrm>
-            <a:off x="4254306" y="1407475"/>
-            <a:ext cx="4439989" cy="2677656"/>
-          </a:xfrm>
-          <a:prstGeom prst="rect">
-            <a:avLst/>
-          </a:prstGeom>
-          <a:noFill/>
-        </p:spPr>
-        <p:txBody>
-          <a:bodyPr wrap="square" rtlCol="0">
-            <a:spAutoFit/>
-          </a:bodyPr>
-          <a:lstStyle/>
-          <a:p>
-            <a:r>
-              <a:rPr lang="en-US" sz="2800" dirty="0" smtClean="0"/>
-              <a:t>You learn </a:t>
-            </a:r>
-            <a:r>
-              <a:rPr lang="en-US" sz="2800" dirty="0" smtClean="0">
-                <a:solidFill>
-                  <a:srgbClr val="FF0000"/>
-                </a:solidFill>
-              </a:rPr>
-              <a:t>STEM skills</a:t>
-            </a:r>
-            <a:r>
-              <a:rPr lang="en-US" sz="2800" dirty="0" smtClean="0"/>
-              <a:t> (Math, Science, Research…) </a:t>
-            </a:r>
-            <a:r>
-              <a:rPr lang="en-US" sz="2800" dirty="0" smtClean="0">
-                <a:solidFill>
-                  <a:srgbClr val="FF0000"/>
-                </a:solidFill>
-              </a:rPr>
-              <a:t>and life skills</a:t>
-            </a:r>
-            <a:r>
-              <a:rPr lang="en-US" sz="2800" dirty="0" smtClean="0"/>
-              <a:t> (teamwork, presentation, interviewing, confidence…) </a:t>
-            </a:r>
-            <a:r>
-              <a:rPr lang="en-US" sz="2800" dirty="0" smtClean="0">
-                <a:solidFill>
-                  <a:srgbClr val="FF0000"/>
-                </a:solidFill>
-              </a:rPr>
-              <a:t>while having fun!</a:t>
-            </a:r>
-            <a:endParaRPr lang="en-US" sz="2800" dirty="0">
-              <a:solidFill>
-                <a:srgbClr val="FF0000"/>
-              </a:solidFill>
-            </a:endParaRPr>
+      <p:sp>
+        <p:nvSpPr>
+          <p:cNvPr id="5" name="Slide Number Placeholder 4"/>
+          <p:cNvSpPr>
+            <a:spLocks noGrp="1"/>
+          </p:cNvSpPr>
+          <p:nvPr>
+            <p:ph type="sldNum" sz="quarter" idx="12"/>
+          </p:nvPr>
+        </p:nvSpPr>
+        <p:spPr/>
+        <p:txBody>
+          <a:bodyPr/>
+          <a:lstStyle/>
+          <a:p>
+            <a:fld id="{8AE9E5C2-A58E-4F36-B7BD-0EB00048A08B}" type="slidenum">
+              <a:rPr lang="en-US" smtClean="0"/>
+              <a:t>8</a:t>
+            </a:fld>
+            <a:endParaRPr lang="en-US"/>
           </a:p>
         </p:txBody>
       </p:sp>
     </p:spTree>
     <p:extLst>
       <p:ext uri="{BB962C8B-B14F-4D97-AF65-F5344CB8AC3E}">
-        <p14:creationId xmlns:p14="http://schemas.microsoft.com/office/powerpoint/2010/main" val="3553371775"/>
+        <p14:creationId xmlns:p14="http://schemas.microsoft.com/office/powerpoint/2010/main" val="1123252857"/>
+      </p:ext>
+    </p:extLst>
+  </p:cSld>
+  <p:clrMapOvr>
+    <a:masterClrMapping/>
+  </p:clrMapOvr>
+</p:sld>
+</file>
+
+<file path=ppt/slides/slide9.xml><?xml version="1.0" encoding="utf-8"?>
+<p:sld xmlns:a="http://schemas.openxmlformats.org/drawingml/2006/main" xmlns:r="http://schemas.openxmlformats.org/officeDocument/2006/relationships" xmlns:p="http://schemas.openxmlformats.org/presentationml/2006/main">
+  <p:cSld>
+    <p:spTree>
+      <p:nvGrpSpPr>
+        <p:cNvPr id="1" name=""/>
+        <p:cNvGrpSpPr/>
+        <p:nvPr/>
+      </p:nvGrpSpPr>
+      <p:grpSpPr>
+        <a:xfrm>
+          <a:off x="0" y="0"/>
+          <a:ext cx="0" cy="0"/>
+          <a:chOff x="0" y="0"/>
+          <a:chExt cx="0" cy="0"/>
+        </a:xfrm>
+      </p:grpSpPr>
+      <p:sp>
+        <p:nvSpPr>
+          <p:cNvPr id="2" name="Title 1"/>
+          <p:cNvSpPr>
+            <a:spLocks noGrp="1"/>
+          </p:cNvSpPr>
+          <p:nvPr>
+            <p:ph type="title"/>
+          </p:nvPr>
+        </p:nvSpPr>
+        <p:spPr/>
+        <p:txBody>
+          <a:bodyPr>
+            <a:normAutofit/>
+          </a:bodyPr>
+          <a:lstStyle/>
+          <a:p>
+            <a:r>
+              <a:rPr lang="en-US" b="1" dirty="0">
+                <a:solidFill>
+                  <a:srgbClr val="0070C0"/>
+                </a:solidFill>
+              </a:rPr>
+              <a:t>Credits</a:t>
+            </a:r>
+          </a:p>
+        </p:txBody>
+      </p:sp>
+      <p:sp>
+        <p:nvSpPr>
+          <p:cNvPr id="3" name="Content Placeholder 2"/>
+          <p:cNvSpPr>
+            <a:spLocks noGrp="1"/>
+          </p:cNvSpPr>
+          <p:nvPr>
+            <p:ph idx="1"/>
+          </p:nvPr>
+        </p:nvSpPr>
+        <p:spPr/>
+        <p:txBody>
+          <a:bodyPr/>
+          <a:lstStyle/>
+          <a:p>
+            <a:r>
+              <a:rPr lang="en-US" dirty="0" smtClean="0"/>
+              <a:t>This presentation was compiled by Sanjay and Arvind Seshan</a:t>
+            </a:r>
+          </a:p>
+          <a:p>
+            <a:r>
+              <a:rPr lang="en-US" dirty="0" smtClean="0"/>
+              <a:t>Photos By: Not the Droids You Are Looking For, Razorback FIRST LEGO League Invitational (2015)</a:t>
+            </a:r>
+            <a:endParaRPr lang="en-US" dirty="0"/>
+          </a:p>
+        </p:txBody>
+      </p:sp>
+      <p:sp>
+        <p:nvSpPr>
+          <p:cNvPr id="6" name="Slide Number Placeholder 5"/>
+          <p:cNvSpPr>
+            <a:spLocks noGrp="1"/>
+          </p:cNvSpPr>
+          <p:nvPr>
+            <p:ph type="sldNum" sz="quarter" idx="12"/>
+          </p:nvPr>
+        </p:nvSpPr>
+        <p:spPr/>
+        <p:txBody>
+          <a:bodyPr/>
+          <a:lstStyle/>
+          <a:p>
+            <a:fld id="{8AE9E5C2-A58E-4F36-B7BD-0EB00048A08B}" type="slidenum">
+              <a:rPr lang="en-US" smtClean="0"/>
+              <a:t>9</a:t>
+            </a:fld>
+            <a:endParaRPr lang="en-US"/>
+          </a:p>
+        </p:txBody>
+      </p:sp>
+    </p:spTree>
+    <p:extLst>
+      <p:ext uri="{BB962C8B-B14F-4D97-AF65-F5344CB8AC3E}">
+        <p14:creationId xmlns:p14="http://schemas.microsoft.com/office/powerpoint/2010/main" val="292068922"/>
       </p:ext>
     </p:extLst>
   </p:cSld>
@@ -4551,4 +5653,265 @@
     </a:ext>
   </a:extLst>
 </a:theme>
+</file>
+
+<file path=ppt/theme/theme2.xml><?xml version="1.0" encoding="utf-8"?>
+<a:theme xmlns:a="http://schemas.openxmlformats.org/drawingml/2006/main" name="Office Theme">
+  <a:themeElements>
+    <a:clrScheme name="Office">
+      <a:dk1>
+        <a:sysClr val="windowText" lastClr="000000"/>
+      </a:dk1>
+      <a:lt1>
+        <a:sysClr val="window" lastClr="FFFFFF"/>
+      </a:lt1>
+      <a:dk2>
+        <a:srgbClr val="44546A"/>
+      </a:dk2>
+      <a:lt2>
+        <a:srgbClr val="E7E6E6"/>
+      </a:lt2>
+      <a:accent1>
+        <a:srgbClr val="4472C4"/>
+      </a:accent1>
+      <a:accent2>
+        <a:srgbClr val="ED7D31"/>
+      </a:accent2>
+      <a:accent3>
+        <a:srgbClr val="A5A5A5"/>
+      </a:accent3>
+      <a:accent4>
+        <a:srgbClr val="FFC000"/>
+      </a:accent4>
+      <a:accent5>
+        <a:srgbClr val="5B9BD5"/>
+      </a:accent5>
+      <a:accent6>
+        <a:srgbClr val="70AD47"/>
+      </a:accent6>
+      <a:hlink>
+        <a:srgbClr val="0563C1"/>
+      </a:hlink>
+      <a:folHlink>
+        <a:srgbClr val="954F72"/>
+      </a:folHlink>
+    </a:clrScheme>
+    <a:fontScheme name="Office">
+      <a:majorFont>
+        <a:latin typeface="Calibri Light" panose="020F0302020204030204"/>
+        <a:ea typeface=""/>
+        <a:cs typeface=""/>
+        <a:font script="Jpan" typeface="Yu Gothic Light"/>
+        <a:font script="Hang" typeface="맑은 고딕"/>
+        <a:font script="Hans" typeface="DengXian Light"/>
+        <a:font script="Hant" typeface="新細明體"/>
+        <a:font script="Arab" typeface="Times New Roman"/>
+        <a:font script="Hebr" typeface="Times New Roman"/>
+        <a:font script="Thai" typeface="Angsana New"/>
+        <a:font script="Ethi" typeface="Nyala"/>
+        <a:font script="Beng" typeface="Vrinda"/>
+        <a:font script="Gujr" typeface="Shruti"/>
+        <a:font script="Khmr" typeface="MoolBoran"/>
+        <a:font script="Knda" typeface="Tunga"/>
+        <a:font script="Guru" typeface="Raavi"/>
+        <a:font script="Cans" typeface="Euphemia"/>
+        <a:font script="Cher" typeface="Plantagenet Cherokee"/>
+        <a:font script="Yiii" typeface="Microsoft Yi Baiti"/>
+        <a:font script="Tibt" typeface="Microsoft Himalaya"/>
+        <a:font script="Thaa" typeface="MV Boli"/>
+        <a:font script="Deva" typeface="Mangal"/>
+        <a:font script="Telu" typeface="Gautami"/>
+        <a:font script="Taml" typeface="Latha"/>
+        <a:font script="Syrc" typeface="Estrangelo Edessa"/>
+        <a:font script="Orya" typeface="Kalinga"/>
+        <a:font script="Mlym" typeface="Kartika"/>
+        <a:font script="Laoo" typeface="DokChampa"/>
+        <a:font script="Sinh" typeface="Iskoola Pota"/>
+        <a:font script="Mong" typeface="Mongolian Baiti"/>
+        <a:font script="Viet" typeface="Times New Roman"/>
+        <a:font script="Uigh" typeface="Microsoft Uighur"/>
+        <a:font script="Geor" typeface="Sylfaen"/>
+      </a:majorFont>
+      <a:minorFont>
+        <a:latin typeface="Calibri" panose="020F0502020204030204"/>
+        <a:ea typeface=""/>
+        <a:cs typeface=""/>
+        <a:font script="Jpan" typeface="Yu Gothic"/>
+        <a:font script="Hang" typeface="맑은 고딕"/>
+        <a:font script="Hans" typeface="DengXian"/>
+        <a:font script="Hant" typeface="新細明體"/>
+        <a:font script="Arab" typeface="Arial"/>
+        <a:font script="Hebr" typeface="Arial"/>
+        <a:font script="Thai" typeface="Cordia New"/>
+        <a:font script="Ethi" typeface="Nyala"/>
+        <a:font script="Beng" typeface="Vrinda"/>
+        <a:font script="Gujr" typeface="Shruti"/>
+        <a:font script="Khmr" typeface="DaunPenh"/>
+        <a:font script="Knda" typeface="Tunga"/>
+        <a:font script="Guru" typeface="Raavi"/>
+        <a:font script="Cans" typeface="Euphemia"/>
+        <a:font script="Cher" typeface="Plantagenet Cherokee"/>
+        <a:font script="Yiii" typeface="Microsoft Yi Baiti"/>
+        <a:font script="Tibt" typeface="Microsoft Himalaya"/>
+        <a:font script="Thaa" typeface="MV Boli"/>
+        <a:font script="Deva" typeface="Mangal"/>
+        <a:font script="Telu" typeface="Gautami"/>
+        <a:font script="Taml" typeface="Latha"/>
+        <a:font script="Syrc" typeface="Estrangelo Edessa"/>
+        <a:font script="Orya" typeface="Kalinga"/>
+        <a:font script="Mlym" typeface="Kartika"/>
+        <a:font script="Laoo" typeface="DokChampa"/>
+        <a:font script="Sinh" typeface="Iskoola Pota"/>
+        <a:font script="Mong" typeface="Mongolian Baiti"/>
+        <a:font script="Viet" typeface="Arial"/>
+        <a:font script="Uigh" typeface="Microsoft Uighur"/>
+        <a:font script="Geor" typeface="Sylfaen"/>
+      </a:minorFont>
+    </a:fontScheme>
+    <a:fmtScheme name="Office">
+      <a:fillStyleLst>
+        <a:solidFill>
+          <a:schemeClr val="phClr"/>
+        </a:solidFill>
+        <a:gradFill rotWithShape="1">
+          <a:gsLst>
+            <a:gs pos="0">
+              <a:schemeClr val="phClr">
+                <a:lumMod val="110000"/>
+                <a:satMod val="105000"/>
+                <a:tint val="67000"/>
+              </a:schemeClr>
+            </a:gs>
+            <a:gs pos="50000">
+              <a:schemeClr val="phClr">
+                <a:lumMod val="105000"/>
+                <a:satMod val="103000"/>
+                <a:tint val="73000"/>
+              </a:schemeClr>
+            </a:gs>
+            <a:gs pos="100000">
+              <a:schemeClr val="phClr">
+                <a:lumMod val="105000"/>
+                <a:satMod val="109000"/>
+                <a:tint val="81000"/>
+              </a:schemeClr>
+            </a:gs>
+          </a:gsLst>
+          <a:lin ang="5400000" scaled="0"/>
+        </a:gradFill>
+        <a:gradFill rotWithShape="1">
+          <a:gsLst>
+            <a:gs pos="0">
+              <a:schemeClr val="phClr">
+                <a:satMod val="103000"/>
+                <a:lumMod val="102000"/>
+                <a:tint val="94000"/>
+              </a:schemeClr>
+            </a:gs>
+            <a:gs pos="50000">
+              <a:schemeClr val="phClr">
+                <a:satMod val="110000"/>
+                <a:lumMod val="100000"/>
+                <a:shade val="100000"/>
+              </a:schemeClr>
+            </a:gs>
+            <a:gs pos="100000">
+              <a:schemeClr val="phClr">
+                <a:lumMod val="99000"/>
+                <a:satMod val="120000"/>
+                <a:shade val="78000"/>
+              </a:schemeClr>
+            </a:gs>
+          </a:gsLst>
+          <a:lin ang="5400000" scaled="0"/>
+        </a:gradFill>
+      </a:fillStyleLst>
+      <a:lnStyleLst>
+        <a:ln w="6350" cap="flat" cmpd="sng" algn="ctr">
+          <a:solidFill>
+            <a:schemeClr val="phClr"/>
+          </a:solidFill>
+          <a:prstDash val="solid"/>
+          <a:miter lim="800000"/>
+        </a:ln>
+        <a:ln w="12700" cap="flat" cmpd="sng" algn="ctr">
+          <a:solidFill>
+            <a:schemeClr val="phClr"/>
+          </a:solidFill>
+          <a:prstDash val="solid"/>
+          <a:miter lim="800000"/>
+        </a:ln>
+        <a:ln w="19050" cap="flat" cmpd="sng" algn="ctr">
+          <a:solidFill>
+            <a:schemeClr val="phClr"/>
+          </a:solidFill>
+          <a:prstDash val="solid"/>
+          <a:miter lim="800000"/>
+        </a:ln>
+      </a:lnStyleLst>
+      <a:effectStyleLst>
+        <a:effectStyle>
+          <a:effectLst/>
+        </a:effectStyle>
+        <a:effectStyle>
+          <a:effectLst/>
+        </a:effectStyle>
+        <a:effectStyle>
+          <a:effectLst>
+            <a:outerShdw blurRad="57150" dist="19050" dir="5400000" algn="ctr" rotWithShape="0">
+              <a:srgbClr val="000000">
+                <a:alpha val="63000"/>
+              </a:srgbClr>
+            </a:outerShdw>
+          </a:effectLst>
+        </a:effectStyle>
+      </a:effectStyleLst>
+      <a:bgFillStyleLst>
+        <a:solidFill>
+          <a:schemeClr val="phClr"/>
+        </a:solidFill>
+        <a:solidFill>
+          <a:schemeClr val="phClr">
+            <a:tint val="95000"/>
+            <a:satMod val="170000"/>
+          </a:schemeClr>
+        </a:solidFill>
+        <a:gradFill rotWithShape="1">
+          <a:gsLst>
+            <a:gs pos="0">
+              <a:schemeClr val="phClr">
+                <a:tint val="93000"/>
+                <a:satMod val="150000"/>
+                <a:shade val="98000"/>
+                <a:lumMod val="102000"/>
+              </a:schemeClr>
+            </a:gs>
+            <a:gs pos="50000">
+              <a:schemeClr val="phClr">
+                <a:tint val="98000"/>
+                <a:satMod val="130000"/>
+                <a:shade val="90000"/>
+                <a:lumMod val="103000"/>
+              </a:schemeClr>
+            </a:gs>
+            <a:gs pos="100000">
+              <a:schemeClr val="phClr">
+                <a:shade val="63000"/>
+                <a:satMod val="120000"/>
+              </a:schemeClr>
+            </a:gs>
+          </a:gsLst>
+          <a:lin ang="5400000" scaled="0"/>
+        </a:gradFill>
+      </a:bgFillStyleLst>
+    </a:fmtScheme>
+  </a:themeElements>
+  <a:objectDefaults/>
+  <a:extraClrSchemeLst/>
+  <a:extLst>
+    <a:ext uri="{05A4C25C-085E-4340-85A3-A5531E510DB2}">
+      <thm15:themeFamily xmlns:thm15="http://schemas.microsoft.com/office/thememl/2012/main" name="Office Theme" id="{62F939B6-93AF-4DB8-9C6B-D6C7DFDC589F}" vid="{4A3C46E8-61CC-4603-A589-7422A47A8E4A}"/>
+    </a:ext>
+  </a:extLst>
+</a:theme>
 </file>
</xml_diff>